<commit_message>
added (not shown here)
</commit_message>
<xml_diff>
--- a/saturn/epi(presumed)-vs-saturn.pptx
+++ b/saturn/epi(presumed)-vs-saturn.pptx
@@ -10468,8 +10468,8 @@
         </p:nvSpPr>
         <p:spPr>
           <a:xfrm>
-            <a:off x="4860032" y="3933056"/>
-            <a:ext cx="3963014" cy="2708434"/>
+            <a:off x="4788024" y="3933056"/>
+            <a:ext cx="4032448" cy="2708434"/>
           </a:xfrm>
           <a:prstGeom prst="rect">
             <a:avLst/>
@@ -10588,7 +10588,21 @@
                 <a:latin typeface="Arial" panose="020B0604020202020204" pitchFamily="34" charset="0"/>
                 <a:cs typeface="Arial" panose="020B0604020202020204" pitchFamily="34" charset="0"/>
               </a:rPr>
-              <a:t> created during the user’s authorization, only </a:t>
+              <a:t> created during </a:t>
+            </a:r>
+            <a:r>
+              <a:rPr lang="en-US" sz="1000" dirty="0" smtClean="0">
+                <a:latin typeface="Arial" panose="020B0604020202020204" pitchFamily="34" charset="0"/>
+                <a:cs typeface="Arial" panose="020B0604020202020204" pitchFamily="34" charset="0"/>
+              </a:rPr>
+              <a:t>the (not shown here) </a:t>
+            </a:r>
+            <a:r>
+              <a:rPr lang="en-US" sz="1000" dirty="0" smtClean="0">
+                <a:latin typeface="Arial" panose="020B0604020202020204" pitchFamily="34" charset="0"/>
+                <a:cs typeface="Arial" panose="020B0604020202020204" pitchFamily="34" charset="0"/>
+              </a:rPr>
+              <a:t>user’s authorization, only </a:t>
             </a:r>
             <a:r>
               <a:rPr lang="en-US" sz="1000" i="1" dirty="0" smtClean="0">
@@ -11549,14 +11563,7 @@
                 <a:latin typeface="Arial" panose="020B0604020202020204" pitchFamily="34" charset="0"/>
                 <a:cs typeface="Arial" panose="020B0604020202020204" pitchFamily="34" charset="0"/>
               </a:rPr>
-              <a:t>1. </a:t>
-            </a:r>
-            <a:r>
-              <a:rPr lang="en-US" sz="1000" dirty="0" smtClean="0">
-                <a:latin typeface="Arial" panose="020B0604020202020204" pitchFamily="34" charset="0"/>
-                <a:cs typeface="Arial" panose="020B0604020202020204" pitchFamily="34" charset="0"/>
-              </a:rPr>
-              <a:t>Request</a:t>
+              <a:t>1. Request</a:t>
             </a:r>
             <a:endParaRPr lang="en-US" sz="1000" dirty="0">
               <a:latin typeface="Arial" panose="020B0604020202020204" pitchFamily="34" charset="0"/>
@@ -11608,14 +11615,7 @@
                 <a:latin typeface="Arial" panose="020B0604020202020204" pitchFamily="34" charset="0"/>
                 <a:cs typeface="Arial" panose="020B0604020202020204" pitchFamily="34" charset="0"/>
               </a:rPr>
-              <a:t>2. </a:t>
-            </a:r>
-            <a:r>
-              <a:rPr lang="en-US" sz="1000" dirty="0" smtClean="0">
-                <a:latin typeface="Arial" panose="020B0604020202020204" pitchFamily="34" charset="0"/>
-                <a:cs typeface="Arial" panose="020B0604020202020204" pitchFamily="34" charset="0"/>
-              </a:rPr>
-              <a:t>Lookup</a:t>
+              <a:t>2. Lookup</a:t>
             </a:r>
             <a:endParaRPr lang="en-US" sz="1000" dirty="0">
               <a:latin typeface="Arial" panose="020B0604020202020204" pitchFamily="34" charset="0"/>

</xml_diff>

<commit_message>
Wordsmithing security + beautifying
</commit_message>
<xml_diff>
--- a/saturn/epi(presumed)-vs-saturn.pptx
+++ b/saturn/epi(presumed)-vs-saturn.pptx
@@ -288,7 +288,7 @@
           <a:p>
             <a:fld id="{FC080E38-6FF2-48B3-BDAB-4FA23B840E92}" type="datetimeFigureOut">
               <a:rPr lang="en-US" smtClean="0"/>
-              <a:t>2020-11-26</a:t>
+              <a:t>2020-11-27</a:t>
             </a:fld>
             <a:endParaRPr lang="en-US"/>
           </a:p>
@@ -458,7 +458,7 @@
           <a:p>
             <a:fld id="{FC080E38-6FF2-48B3-BDAB-4FA23B840E92}" type="datetimeFigureOut">
               <a:rPr lang="en-US" smtClean="0"/>
-              <a:t>2020-11-26</a:t>
+              <a:t>2020-11-27</a:t>
             </a:fld>
             <a:endParaRPr lang="en-US"/>
           </a:p>
@@ -638,7 +638,7 @@
           <a:p>
             <a:fld id="{FC080E38-6FF2-48B3-BDAB-4FA23B840E92}" type="datetimeFigureOut">
               <a:rPr lang="en-US" smtClean="0"/>
-              <a:t>2020-11-26</a:t>
+              <a:t>2020-11-27</a:t>
             </a:fld>
             <a:endParaRPr lang="en-US"/>
           </a:p>
@@ -808,7 +808,7 @@
           <a:p>
             <a:fld id="{FC080E38-6FF2-48B3-BDAB-4FA23B840E92}" type="datetimeFigureOut">
               <a:rPr lang="en-US" smtClean="0"/>
-              <a:t>2020-11-26</a:t>
+              <a:t>2020-11-27</a:t>
             </a:fld>
             <a:endParaRPr lang="en-US"/>
           </a:p>
@@ -1054,7 +1054,7 @@
           <a:p>
             <a:fld id="{FC080E38-6FF2-48B3-BDAB-4FA23B840E92}" type="datetimeFigureOut">
               <a:rPr lang="en-US" smtClean="0"/>
-              <a:t>2020-11-26</a:t>
+              <a:t>2020-11-27</a:t>
             </a:fld>
             <a:endParaRPr lang="en-US"/>
           </a:p>
@@ -1342,7 +1342,7 @@
           <a:p>
             <a:fld id="{FC080E38-6FF2-48B3-BDAB-4FA23B840E92}" type="datetimeFigureOut">
               <a:rPr lang="en-US" smtClean="0"/>
-              <a:t>2020-11-26</a:t>
+              <a:t>2020-11-27</a:t>
             </a:fld>
             <a:endParaRPr lang="en-US"/>
           </a:p>
@@ -1764,7 +1764,7 @@
           <a:p>
             <a:fld id="{FC080E38-6FF2-48B3-BDAB-4FA23B840E92}" type="datetimeFigureOut">
               <a:rPr lang="en-US" smtClean="0"/>
-              <a:t>2020-11-26</a:t>
+              <a:t>2020-11-27</a:t>
             </a:fld>
             <a:endParaRPr lang="en-US"/>
           </a:p>
@@ -1882,7 +1882,7 @@
           <a:p>
             <a:fld id="{FC080E38-6FF2-48B3-BDAB-4FA23B840E92}" type="datetimeFigureOut">
               <a:rPr lang="en-US" smtClean="0"/>
-              <a:t>2020-11-26</a:t>
+              <a:t>2020-11-27</a:t>
             </a:fld>
             <a:endParaRPr lang="en-US"/>
           </a:p>
@@ -1977,7 +1977,7 @@
           <a:p>
             <a:fld id="{FC080E38-6FF2-48B3-BDAB-4FA23B840E92}" type="datetimeFigureOut">
               <a:rPr lang="en-US" smtClean="0"/>
-              <a:t>2020-11-26</a:t>
+              <a:t>2020-11-27</a:t>
             </a:fld>
             <a:endParaRPr lang="en-US"/>
           </a:p>
@@ -2254,7 +2254,7 @@
           <a:p>
             <a:fld id="{FC080E38-6FF2-48B3-BDAB-4FA23B840E92}" type="datetimeFigureOut">
               <a:rPr lang="en-US" smtClean="0"/>
-              <a:t>2020-11-26</a:t>
+              <a:t>2020-11-27</a:t>
             </a:fld>
             <a:endParaRPr lang="en-US"/>
           </a:p>
@@ -2507,7 +2507,7 @@
           <a:p>
             <a:fld id="{FC080E38-6FF2-48B3-BDAB-4FA23B840E92}" type="datetimeFigureOut">
               <a:rPr lang="en-US" smtClean="0"/>
-              <a:t>2020-11-26</a:t>
+              <a:t>2020-11-27</a:t>
             </a:fld>
             <a:endParaRPr lang="en-US"/>
           </a:p>
@@ -2720,7 +2720,7 @@
           <a:p>
             <a:fld id="{FC080E38-6FF2-48B3-BDAB-4FA23B840E92}" type="datetimeFigureOut">
               <a:rPr lang="en-US" smtClean="0"/>
-              <a:t>2020-11-26</a:t>
+              <a:t>2020-11-27</a:t>
             </a:fld>
             <a:endParaRPr lang="en-US"/>
           </a:p>
@@ -3095,6 +3095,141 @@
           <a:chExt cx="0" cy="0"/>
         </a:xfrm>
       </p:grpSpPr>
+      <p:cxnSp>
+        <p:nvCxnSpPr>
+          <p:cNvPr id="23" name="Straight Arrow Connector 22"/>
+          <p:cNvCxnSpPr>
+            <a:endCxn id="200" idx="1"/>
+          </p:cNvCxnSpPr>
+          <p:nvPr/>
+        </p:nvCxnSpPr>
+        <p:spPr>
+          <a:xfrm flipV="1">
+            <a:off x="6320089" y="1469678"/>
+            <a:ext cx="1141053" cy="930062"/>
+          </a:xfrm>
+          <a:prstGeom prst="straightConnector1">
+            <a:avLst/>
+          </a:prstGeom>
+          <a:ln w="9525">
+            <a:solidFill>
+              <a:schemeClr val="bg1">
+                <a:lumMod val="50000"/>
+              </a:schemeClr>
+            </a:solidFill>
+            <a:prstDash val="sysDash"/>
+            <a:tailEnd type="triangle" w="sm" len="sm"/>
+          </a:ln>
+        </p:spPr>
+        <p:style>
+          <a:lnRef idx="1">
+            <a:schemeClr val="accent1"/>
+          </a:lnRef>
+          <a:fillRef idx="0">
+            <a:schemeClr val="accent1"/>
+          </a:fillRef>
+          <a:effectRef idx="0">
+            <a:schemeClr val="accent1"/>
+          </a:effectRef>
+          <a:fontRef idx="minor">
+            <a:schemeClr val="tx1"/>
+          </a:fontRef>
+        </p:style>
+      </p:cxnSp>
+      <p:grpSp>
+        <p:nvGrpSpPr>
+          <p:cNvPr id="4" name="Group 3"/>
+          <p:cNvGrpSpPr/>
+          <p:nvPr/>
+        </p:nvGrpSpPr>
+        <p:grpSpPr>
+          <a:xfrm>
+            <a:off x="6414398" y="2045350"/>
+            <a:ext cx="354584" cy="246221"/>
+            <a:chOff x="6414398" y="2045350"/>
+            <a:chExt cx="354584" cy="246221"/>
+          </a:xfrm>
+        </p:grpSpPr>
+        <p:sp>
+          <p:nvSpPr>
+            <p:cNvPr id="2" name="Oval 1"/>
+            <p:cNvSpPr/>
+            <p:nvPr/>
+          </p:nvSpPr>
+          <p:spPr>
+            <a:xfrm>
+              <a:off x="6518614" y="2093005"/>
+              <a:ext cx="144000" cy="144000"/>
+            </a:xfrm>
+            <a:prstGeom prst="ellipse">
+              <a:avLst/>
+            </a:prstGeom>
+            <a:solidFill>
+              <a:schemeClr val="bg1"/>
+            </a:solidFill>
+            <a:ln>
+              <a:noFill/>
+            </a:ln>
+          </p:spPr>
+          <p:style>
+            <a:lnRef idx="2">
+              <a:schemeClr val="accent1">
+                <a:shade val="50000"/>
+              </a:schemeClr>
+            </a:lnRef>
+            <a:fillRef idx="1">
+              <a:schemeClr val="accent1"/>
+            </a:fillRef>
+            <a:effectRef idx="0">
+              <a:schemeClr val="accent1"/>
+            </a:effectRef>
+            <a:fontRef idx="minor">
+              <a:schemeClr val="lt1"/>
+            </a:fontRef>
+          </p:style>
+          <p:txBody>
+            <a:bodyPr rtlCol="0" anchor="ctr"/>
+            <a:lstStyle/>
+            <a:p>
+              <a:pPr algn="ctr"/>
+              <a:endParaRPr lang="en-US"/>
+            </a:p>
+          </p:txBody>
+        </p:sp>
+        <p:sp>
+          <p:nvSpPr>
+            <p:cNvPr id="164" name="TextBox 163"/>
+            <p:cNvSpPr txBox="1"/>
+            <p:nvPr/>
+          </p:nvSpPr>
+          <p:spPr>
+            <a:xfrm>
+              <a:off x="6414398" y="2045350"/>
+              <a:ext cx="354584" cy="246221"/>
+            </a:xfrm>
+            <a:prstGeom prst="rect">
+              <a:avLst/>
+            </a:prstGeom>
+            <a:noFill/>
+          </p:spPr>
+          <p:txBody>
+            <a:bodyPr wrap="none" rtlCol="0">
+              <a:spAutoFit/>
+            </a:bodyPr>
+            <a:lstStyle/>
+            <a:p>
+              <a:r>
+                <a:rPr lang="en-US" sz="1000" dirty="0" smtClean="0">
+                  <a:latin typeface="Calibri"/>
+                  <a:sym typeface="Wingdings"/>
+                </a:rPr>
+                <a:t>①</a:t>
+              </a:r>
+              <a:endParaRPr lang="en-US" sz="1000" dirty="0"/>
+            </a:p>
+          </p:txBody>
+        </p:sp>
+      </p:grpSp>
       <p:sp>
         <p:nvSpPr>
           <p:cNvPr id="318" name="Rounded Rectangle 317"/>
@@ -6970,7 +7105,7 @@
           <a:p>
             <a:pPr algn="ctr"/>
             <a:r>
-              <a:rPr lang="en-US" sz="1400" dirty="0" smtClean="0">
+              <a:rPr lang="en-US" sz="1200" dirty="0" smtClean="0">
                 <a:solidFill>
                   <a:schemeClr val="tx1"/>
                 </a:solidFill>
@@ -6979,7 +7114,7 @@
               </a:rPr>
               <a:t>Acquirer</a:t>
             </a:r>
-            <a:endParaRPr lang="en-US" sz="1400" dirty="0">
+            <a:endParaRPr lang="en-US" sz="1200" dirty="0">
               <a:solidFill>
                 <a:schemeClr val="tx1"/>
               </a:solidFill>
@@ -7058,7 +7193,7 @@
           <a:p>
             <a:pPr algn="ctr"/>
             <a:r>
-              <a:rPr lang="en-US" sz="1400" dirty="0" smtClean="0">
+              <a:rPr lang="en-US" sz="1200" dirty="0" smtClean="0">
                 <a:solidFill>
                   <a:schemeClr val="tx1"/>
                 </a:solidFill>
@@ -7067,7 +7202,7 @@
               </a:rPr>
               <a:t>Acquirer</a:t>
             </a:r>
-            <a:endParaRPr lang="en-US" sz="1400" dirty="0">
+            <a:endParaRPr lang="en-US" sz="1200" dirty="0">
               <a:solidFill>
                 <a:schemeClr val="tx1"/>
               </a:solidFill>
@@ -7776,7 +7911,7 @@
           <a:p>
             <a:pPr algn="ctr"/>
             <a:r>
-              <a:rPr lang="en-US" sz="1400" dirty="0" smtClean="0">
+              <a:rPr lang="en-US" sz="1200" dirty="0" smtClean="0">
                 <a:solidFill>
                   <a:schemeClr val="tx1"/>
                 </a:solidFill>
@@ -7785,7 +7920,7 @@
               </a:rPr>
               <a:t>Acquirer</a:t>
             </a:r>
-            <a:endParaRPr lang="en-US" sz="1400" dirty="0">
+            <a:endParaRPr lang="en-US" sz="1200" dirty="0">
               <a:solidFill>
                 <a:schemeClr val="tx1"/>
               </a:solidFill>
@@ -9685,47 +9820,6 @@
           </p:txBody>
         </p:sp>
       </p:grpSp>
-      <p:cxnSp>
-        <p:nvCxnSpPr>
-          <p:cNvPr id="23" name="Straight Arrow Connector 22"/>
-          <p:cNvCxnSpPr>
-            <a:endCxn id="200" idx="1"/>
-          </p:cNvCxnSpPr>
-          <p:nvPr/>
-        </p:nvCxnSpPr>
-        <p:spPr>
-          <a:xfrm flipV="1">
-            <a:off x="6320089" y="1469678"/>
-            <a:ext cx="1141053" cy="930062"/>
-          </a:xfrm>
-          <a:prstGeom prst="straightConnector1">
-            <a:avLst/>
-          </a:prstGeom>
-          <a:ln w="9525">
-            <a:solidFill>
-              <a:schemeClr val="bg1">
-                <a:lumMod val="50000"/>
-              </a:schemeClr>
-            </a:solidFill>
-            <a:prstDash val="sysDash"/>
-            <a:tailEnd type="triangle" w="sm" len="sm"/>
-          </a:ln>
-        </p:spPr>
-        <p:style>
-          <a:lnRef idx="1">
-            <a:schemeClr val="accent1"/>
-          </a:lnRef>
-          <a:fillRef idx="0">
-            <a:schemeClr val="accent1"/>
-          </a:fillRef>
-          <a:effectRef idx="0">
-            <a:schemeClr val="accent1"/>
-          </a:effectRef>
-          <a:fontRef idx="minor">
-            <a:schemeClr val="tx1"/>
-          </a:fontRef>
-        </p:style>
-      </p:cxnSp>
       <p:cxnSp>
         <p:nvCxnSpPr>
           <p:cNvPr id="305" name="Straight Arrow Connector 304"/>
@@ -10155,8 +10249,8 @@
         </p:nvSpPr>
         <p:spPr>
           <a:xfrm>
-            <a:off x="323528" y="1826233"/>
-            <a:ext cx="930063" cy="307777"/>
+            <a:off x="380354" y="1852063"/>
+            <a:ext cx="824265" cy="276999"/>
           </a:xfrm>
           <a:prstGeom prst="rect">
             <a:avLst/>
@@ -10169,14 +10263,15 @@
           </a:bodyPr>
           <a:lstStyle/>
           <a:p>
+            <a:pPr algn="ctr"/>
             <a:r>
-              <a:rPr lang="en-US" sz="1400" dirty="0" smtClean="0">
+              <a:rPr lang="en-US" sz="1200" dirty="0" smtClean="0">
                 <a:latin typeface="Arial" panose="020B0604020202020204" pitchFamily="34" charset="0"/>
                 <a:cs typeface="Arial" panose="020B0604020202020204" pitchFamily="34" charset="0"/>
               </a:rPr>
               <a:t>Merchant</a:t>
             </a:r>
-            <a:endParaRPr lang="en-US" sz="1400" dirty="0">
+            <a:endParaRPr lang="en-US" sz="1200" dirty="0">
               <a:latin typeface="Arial" panose="020B0604020202020204" pitchFamily="34" charset="0"/>
               <a:cs typeface="Arial" panose="020B0604020202020204" pitchFamily="34" charset="0"/>
             </a:endParaRPr>
@@ -10191,8 +10286,8 @@
         </p:nvSpPr>
         <p:spPr>
           <a:xfrm>
-            <a:off x="5502938" y="1826233"/>
-            <a:ext cx="930063" cy="307777"/>
+            <a:off x="5549432" y="1852063"/>
+            <a:ext cx="824265" cy="276999"/>
           </a:xfrm>
           <a:prstGeom prst="rect">
             <a:avLst/>
@@ -10205,14 +10300,15 @@
           </a:bodyPr>
           <a:lstStyle/>
           <a:p>
+            <a:pPr algn="ctr"/>
             <a:r>
-              <a:rPr lang="en-US" sz="1400" dirty="0" smtClean="0">
+              <a:rPr lang="en-US" sz="1200" dirty="0" smtClean="0">
                 <a:latin typeface="Arial" panose="020B0604020202020204" pitchFamily="34" charset="0"/>
                 <a:cs typeface="Arial" panose="020B0604020202020204" pitchFamily="34" charset="0"/>
               </a:rPr>
               <a:t>Merchant</a:t>
             </a:r>
-            <a:endParaRPr lang="en-US" sz="1400" dirty="0">
+            <a:endParaRPr lang="en-US" sz="1200" dirty="0">
               <a:latin typeface="Arial" panose="020B0604020202020204" pitchFamily="34" charset="0"/>
               <a:cs typeface="Arial" panose="020B0604020202020204" pitchFamily="34" charset="0"/>
             </a:endParaRPr>
@@ -10227,8 +10323,8 @@
         </p:nvSpPr>
         <p:spPr>
           <a:xfrm>
-            <a:off x="3480312" y="746113"/>
-            <a:ext cx="1220206" cy="307777"/>
+            <a:off x="3540598" y="775737"/>
+            <a:ext cx="1072730" cy="276999"/>
           </a:xfrm>
           <a:prstGeom prst="rect">
             <a:avLst/>
@@ -10241,14 +10337,15 @@
           </a:bodyPr>
           <a:lstStyle/>
           <a:p>
+            <a:pPr algn="ctr"/>
             <a:r>
-              <a:rPr lang="en-US" sz="1400" dirty="0" smtClean="0">
+              <a:rPr lang="en-US" sz="1200" dirty="0" smtClean="0">
                 <a:latin typeface="Arial" panose="020B0604020202020204" pitchFamily="34" charset="0"/>
                 <a:cs typeface="Arial" panose="020B0604020202020204" pitchFamily="34" charset="0"/>
               </a:rPr>
               <a:t>Issuer Banks</a:t>
             </a:r>
-            <a:endParaRPr lang="en-US" sz="1400" dirty="0">
+            <a:endParaRPr lang="en-US" sz="1200" dirty="0">
               <a:latin typeface="Arial" panose="020B0604020202020204" pitchFamily="34" charset="0"/>
               <a:cs typeface="Arial" panose="020B0604020202020204" pitchFamily="34" charset="0"/>
             </a:endParaRPr>
@@ -10263,8 +10360,8 @@
         </p:nvSpPr>
         <p:spPr>
           <a:xfrm>
-            <a:off x="7246628" y="746113"/>
-            <a:ext cx="1220206" cy="307777"/>
+            <a:off x="7356528" y="775737"/>
+            <a:ext cx="1072730" cy="276999"/>
           </a:xfrm>
           <a:prstGeom prst="rect">
             <a:avLst/>
@@ -10277,14 +10374,15 @@
           </a:bodyPr>
           <a:lstStyle/>
           <a:p>
+            <a:pPr algn="ctr"/>
             <a:r>
-              <a:rPr lang="en-US" sz="1400" dirty="0" smtClean="0">
+              <a:rPr lang="en-US" sz="1200" dirty="0" smtClean="0">
                 <a:latin typeface="Arial" panose="020B0604020202020204" pitchFamily="34" charset="0"/>
                 <a:cs typeface="Arial" panose="020B0604020202020204" pitchFamily="34" charset="0"/>
               </a:rPr>
               <a:t>Issuer Banks</a:t>
             </a:r>
-            <a:endParaRPr lang="en-US" sz="1400" dirty="0">
+            <a:endParaRPr lang="en-US" sz="1200" dirty="0">
               <a:latin typeface="Arial" panose="020B0604020202020204" pitchFamily="34" charset="0"/>
               <a:cs typeface="Arial" panose="020B0604020202020204" pitchFamily="34" charset="0"/>
             </a:endParaRPr>
@@ -10299,8 +10397,8 @@
         </p:nvSpPr>
         <p:spPr>
           <a:xfrm>
-            <a:off x="1413601" y="3748028"/>
-            <a:ext cx="1877437" cy="307777"/>
+            <a:off x="1556268" y="3773858"/>
+            <a:ext cx="1592103" cy="276999"/>
           </a:xfrm>
           <a:prstGeom prst="rect">
             <a:avLst/>
@@ -10315,13 +10413,13 @@
           <a:p>
             <a:pPr algn="ctr"/>
             <a:r>
-              <a:rPr lang="en-US" sz="1400" dirty="0" smtClean="0">
+              <a:rPr lang="en-US" sz="1200" dirty="0" smtClean="0">
                 <a:latin typeface="Arial" panose="020B0604020202020204" pitchFamily="34" charset="0"/>
                 <a:cs typeface="Arial" panose="020B0604020202020204" pitchFamily="34" charset="0"/>
               </a:rPr>
               <a:t>Acceptance Network</a:t>
             </a:r>
-            <a:endParaRPr lang="en-US" sz="1400" dirty="0">
+            <a:endParaRPr lang="en-US" sz="1200" dirty="0">
               <a:latin typeface="Arial" panose="020B0604020202020204" pitchFamily="34" charset="0"/>
               <a:cs typeface="Arial" panose="020B0604020202020204" pitchFamily="34" charset="0"/>
             </a:endParaRPr>
@@ -10570,100 +10668,103 @@
               </a:spcBef>
             </a:pPr>
             <a:r>
-              <a:rPr lang="en-US" sz="1000" dirty="0" smtClean="0">
+              <a:rPr lang="en-US" sz="1000" dirty="0">
                 <a:latin typeface="Arial" panose="020B0604020202020204" pitchFamily="34" charset="0"/>
                 <a:cs typeface="Arial" panose="020B0604020202020204" pitchFamily="34" charset="0"/>
               </a:rPr>
-              <a:t>Security is maintained though </a:t>
+              <a:t>Security with respect to </a:t>
             </a:r>
             <a:r>
               <a:rPr lang="en-US" sz="1000" dirty="0" smtClean="0">
                 <a:latin typeface="Arial" panose="020B0604020202020204" pitchFamily="34" charset="0"/>
                 <a:cs typeface="Arial" panose="020B0604020202020204" pitchFamily="34" charset="0"/>
               </a:rPr>
-              <a:t>a </a:t>
+              <a:t>requests </a:t>
+            </a:r>
+            <a:r>
+              <a:rPr lang="en-US" sz="1000" dirty="0">
+                <a:latin typeface="Arial" panose="020B0604020202020204" pitchFamily="34" charset="0"/>
+                <a:cs typeface="Arial" panose="020B0604020202020204" pitchFamily="34" charset="0"/>
+              </a:rPr>
+              <a:t>(1) is maintained </a:t>
+            </a:r>
+            <a:r>
+              <a:rPr lang="en-US" sz="1000" dirty="0" smtClean="0">
+                <a:latin typeface="Arial" panose="020B0604020202020204" pitchFamily="34" charset="0"/>
+                <a:cs typeface="Arial" panose="020B0604020202020204" pitchFamily="34" charset="0"/>
+              </a:rPr>
+              <a:t>through </a:t>
             </a:r>
             <a:r>
               <a:rPr lang="en-US" sz="1000" i="1" dirty="0" smtClean="0">
                 <a:latin typeface="Arial" panose="020B0604020202020204" pitchFamily="34" charset="0"/>
                 <a:cs typeface="Arial" panose="020B0604020202020204" pitchFamily="34" charset="0"/>
               </a:rPr>
-              <a:t>digital </a:t>
+              <a:t>mutually </a:t>
             </a:r>
             <a:r>
-              <a:rPr lang="en-US" sz="1000" i="1" dirty="0" smtClean="0">
+              <a:rPr lang="en-US" sz="1000" i="1" dirty="0">
                 <a:latin typeface="Arial" panose="020B0604020202020204" pitchFamily="34" charset="0"/>
                 <a:cs typeface="Arial" panose="020B0604020202020204" pitchFamily="34" charset="0"/>
               </a:rPr>
-              <a:t>contract</a:t>
+              <a:t>signed digital contracts</a:t>
+            </a:r>
+            <a:r>
+              <a:rPr lang="en-US" sz="1000" dirty="0">
+                <a:latin typeface="Arial" panose="020B0604020202020204" pitchFamily="34" charset="0"/>
+                <a:cs typeface="Arial" panose="020B0604020202020204" pitchFamily="34" charset="0"/>
+              </a:rPr>
+              <a:t> resulting </a:t>
             </a:r>
             <a:r>
               <a:rPr lang="en-US" sz="1000" dirty="0" smtClean="0">
                 <a:latin typeface="Arial" panose="020B0604020202020204" pitchFamily="34" charset="0"/>
                 <a:cs typeface="Arial" panose="020B0604020202020204" pitchFamily="34" charset="0"/>
               </a:rPr>
-              <a:t> </a:t>
+              <a:t>from the </a:t>
+            </a:r>
+            <a:r>
+              <a:rPr lang="en-US" sz="1000" dirty="0">
+                <a:latin typeface="Arial" panose="020B0604020202020204" pitchFamily="34" charset="0"/>
+                <a:cs typeface="Arial" panose="020B0604020202020204" pitchFamily="34" charset="0"/>
+              </a:rPr>
+              <a:t>(not shown here) Merchant and User authorization </a:t>
             </a:r>
             <a:r>
               <a:rPr lang="en-US" sz="1000" dirty="0" smtClean="0">
                 <a:latin typeface="Arial" panose="020B0604020202020204" pitchFamily="34" charset="0"/>
                 <a:cs typeface="Arial" panose="020B0604020202020204" pitchFamily="34" charset="0"/>
               </a:rPr>
-              <a:t>including the (not </a:t>
+              <a:t>step, combined </a:t>
+            </a:r>
+            <a:r>
+              <a:rPr lang="en-US" sz="1000" dirty="0">
+                <a:latin typeface="Arial" panose="020B0604020202020204" pitchFamily="34" charset="0"/>
+                <a:cs typeface="Arial" panose="020B0604020202020204" pitchFamily="34" charset="0"/>
+              </a:rPr>
+              <a:t>with TS </a:t>
             </a:r>
             <a:r>
               <a:rPr lang="en-US" sz="1000" dirty="0" smtClean="0">
                 <a:latin typeface="Arial" panose="020B0604020202020204" pitchFamily="34" charset="0"/>
                 <a:cs typeface="Arial" panose="020B0604020202020204" pitchFamily="34" charset="0"/>
               </a:rPr>
-              <a:t>shown here) </a:t>
+              <a:t>lookups </a:t>
+            </a:r>
+            <a:r>
+              <a:rPr lang="en-US" sz="1000" dirty="0">
+                <a:latin typeface="Arial" panose="020B0604020202020204" pitchFamily="34" charset="0"/>
+                <a:cs typeface="Arial" panose="020B0604020202020204" pitchFamily="34" charset="0"/>
+              </a:rPr>
+              <a:t>(2</a:t>
             </a:r>
             <a:r>
               <a:rPr lang="en-US" sz="1000" dirty="0" smtClean="0">
                 <a:latin typeface="Arial" panose="020B0604020202020204" pitchFamily="34" charset="0"/>
                 <a:cs typeface="Arial" panose="020B0604020202020204" pitchFamily="34" charset="0"/>
               </a:rPr>
-              <a:t>user’s authorization.  </a:t>
+              <a:t>).</a:t>
             </a:r>
-            <a:r>
-              <a:rPr lang="en-US" sz="1000" dirty="0">
-                <a:latin typeface="Arial" panose="020B0604020202020204" pitchFamily="34" charset="0"/>
-                <a:cs typeface="Arial" panose="020B0604020202020204" pitchFamily="34" charset="0"/>
-              </a:rPr>
-              <a:t>O</a:t>
-            </a:r>
-            <a:r>
-              <a:rPr lang="en-US" sz="1000" smtClean="0">
-                <a:latin typeface="Arial" panose="020B0604020202020204" pitchFamily="34" charset="0"/>
-                <a:cs typeface="Arial" panose="020B0604020202020204" pitchFamily="34" charset="0"/>
-              </a:rPr>
-              <a:t>nly </a:t>
-            </a:r>
-            <a:r>
-              <a:rPr lang="en-US" sz="1000" i="1" dirty="0" smtClean="0">
-                <a:latin typeface="Arial" panose="020B0604020202020204" pitchFamily="34" charset="0"/>
-                <a:cs typeface="Arial" panose="020B0604020202020204" pitchFamily="34" charset="0"/>
-              </a:rPr>
-              <a:t>mutually authorized transaction requests are accepted by the Issuer Banks</a:t>
-            </a:r>
-            <a:r>
-              <a:rPr lang="en-US" sz="1000" dirty="0" smtClean="0">
-                <a:latin typeface="Arial" panose="020B0604020202020204" pitchFamily="34" charset="0"/>
-                <a:cs typeface="Arial" panose="020B0604020202020204" pitchFamily="34" charset="0"/>
-              </a:rPr>
-              <a:t>. </a:t>
-            </a:r>
-            <a:r>
-              <a:rPr lang="en-US" sz="1000" dirty="0">
-                <a:latin typeface="Arial" panose="020B0604020202020204" pitchFamily="34" charset="0"/>
-                <a:cs typeface="Arial" panose="020B0604020202020204" pitchFamily="34" charset="0"/>
-              </a:rPr>
-              <a:t> </a:t>
-            </a:r>
-            <a:endParaRPr lang="en-US" sz="1000" dirty="0" smtClean="0">
-              <a:latin typeface="Arial" panose="020B0604020202020204" pitchFamily="34" charset="0"/>
-              <a:cs typeface="Arial" panose="020B0604020202020204" pitchFamily="34" charset="0"/>
-            </a:endParaRPr>
           </a:p>
           <a:p>
             <a:pPr>
@@ -10676,7 +10777,14 @@
                 <a:latin typeface="Arial" panose="020B0604020202020204" pitchFamily="34" charset="0"/>
                 <a:cs typeface="Arial" panose="020B0604020202020204" pitchFamily="34" charset="0"/>
               </a:rPr>
-              <a:t>The arrows in the diagram are </a:t>
+              <a:t>The </a:t>
+            </a:r>
+            <a:r>
+              <a:rPr lang="en-US" sz="1000" dirty="0" smtClean="0">
+                <a:latin typeface="Arial" panose="020B0604020202020204" pitchFamily="34" charset="0"/>
+                <a:cs typeface="Arial" panose="020B0604020202020204" pitchFamily="34" charset="0"/>
+              </a:rPr>
+              <a:t>arrows in the diagram are </a:t>
             </a:r>
             <a:r>
               <a:rPr lang="en-US" sz="1000" i="1" dirty="0" smtClean="0">
@@ -11361,8 +11469,8 @@
         </p:nvSpPr>
         <p:spPr>
           <a:xfrm>
-            <a:off x="5286914" y="2693422"/>
-            <a:ext cx="1388522" cy="307777"/>
+            <a:off x="5348906" y="2719953"/>
+            <a:ext cx="1217000" cy="276999"/>
           </a:xfrm>
           <a:prstGeom prst="rect">
             <a:avLst/>
@@ -11375,14 +11483,15 @@
           </a:bodyPr>
           <a:lstStyle/>
           <a:p>
+            <a:pPr algn="ctr"/>
             <a:r>
-              <a:rPr lang="en-US" sz="1400" dirty="0" smtClean="0">
+              <a:rPr lang="en-US" sz="1200" dirty="0" smtClean="0">
                 <a:latin typeface="Arial" panose="020B0604020202020204" pitchFamily="34" charset="0"/>
                 <a:cs typeface="Arial" panose="020B0604020202020204" pitchFamily="34" charset="0"/>
               </a:rPr>
               <a:t>Merchant Bank</a:t>
             </a:r>
-            <a:endParaRPr lang="en-US" sz="1400" dirty="0">
+            <a:endParaRPr lang="en-US" sz="1200" dirty="0">
               <a:latin typeface="Arial" panose="020B0604020202020204" pitchFamily="34" charset="0"/>
               <a:cs typeface="Arial" panose="020B0604020202020204" pitchFamily="34" charset="0"/>
             </a:endParaRPr>
@@ -11461,7 +11570,7 @@
           <a:p>
             <a:pPr algn="ctr"/>
             <a:r>
-              <a:rPr lang="en-US" sz="1400" dirty="0" smtClean="0">
+              <a:rPr lang="en-US" sz="1200" dirty="0" smtClean="0">
                 <a:solidFill>
                   <a:schemeClr val="tx1"/>
                 </a:solidFill>
@@ -11470,7 +11579,7 @@
               </a:rPr>
               <a:t>TS</a:t>
             </a:r>
-            <a:endParaRPr lang="en-US" sz="1400" dirty="0">
+            <a:endParaRPr lang="en-US" sz="1200" dirty="0">
               <a:solidFill>
                 <a:schemeClr val="tx1"/>
               </a:solidFill>
@@ -11546,7 +11655,21 @@
                 <a:latin typeface="Arial" panose="020B0604020202020204" pitchFamily="34" charset="0"/>
                 <a:cs typeface="Arial" panose="020B0604020202020204" pitchFamily="34" charset="0"/>
               </a:rPr>
-              <a:t>EPI (Presumed) versus Saturn, AR-2020-11-26</a:t>
+              <a:t>EPI (Presumed) versus Saturn</a:t>
+            </a:r>
+            <a:r>
+              <a:rPr lang="en-US" sz="800" smtClean="0">
+                <a:latin typeface="Arial" panose="020B0604020202020204" pitchFamily="34" charset="0"/>
+                <a:cs typeface="Arial" panose="020B0604020202020204" pitchFamily="34" charset="0"/>
+              </a:rPr>
+              <a:t>, </a:t>
+            </a:r>
+            <a:r>
+              <a:rPr lang="en-US" sz="800" smtClean="0">
+                <a:latin typeface="Arial" panose="020B0604020202020204" pitchFamily="34" charset="0"/>
+                <a:cs typeface="Arial" panose="020B0604020202020204" pitchFamily="34" charset="0"/>
+              </a:rPr>
+              <a:t>AR-2020-11-27</a:t>
             </a:r>
             <a:endParaRPr lang="en-US" sz="800" dirty="0">
               <a:latin typeface="Arial" panose="020B0604020202020204" pitchFamily="34" charset="0"/>
@@ -11563,8 +11686,8 @@
         </p:nvSpPr>
         <p:spPr>
           <a:xfrm>
-            <a:off x="6521102" y="1739638"/>
-            <a:ext cx="738623" cy="182325"/>
+            <a:off x="6588224" y="1739638"/>
+            <a:ext cx="563068" cy="182325"/>
           </a:xfrm>
           <a:prstGeom prst="roundRect">
             <a:avLst/>
@@ -11588,17 +11711,18 @@
           </a:effectLst>
         </p:spPr>
         <p:txBody>
-          <a:bodyPr wrap="none" lIns="36000" tIns="0" rIns="72000" bIns="10800" rtlCol="0" anchor="ctr" anchorCtr="1">
+          <a:bodyPr wrap="none" lIns="36000" tIns="0" rIns="36000" bIns="10800" rtlCol="0" anchor="ctr" anchorCtr="1">
             <a:spAutoFit/>
           </a:bodyPr>
           <a:lstStyle/>
           <a:p>
+            <a:pPr algn="ctr"/>
             <a:r>
               <a:rPr lang="en-US" sz="1000" dirty="0" smtClean="0">
                 <a:latin typeface="Arial" panose="020B0604020202020204" pitchFamily="34" charset="0"/>
                 <a:cs typeface="Arial" panose="020B0604020202020204" pitchFamily="34" charset="0"/>
               </a:rPr>
-              <a:t>1. Request</a:t>
+              <a:t>Request</a:t>
             </a:r>
             <a:endParaRPr lang="en-US" sz="1000" dirty="0">
               <a:latin typeface="Arial" panose="020B0604020202020204" pitchFamily="34" charset="0"/>
@@ -11615,8 +11739,8 @@
         </p:nvSpPr>
         <p:spPr>
           <a:xfrm>
-            <a:off x="6549956" y="2458564"/>
-            <a:ext cx="679799" cy="182325"/>
+            <a:off x="6617915" y="2412070"/>
+            <a:ext cx="503686" cy="182325"/>
           </a:xfrm>
           <a:prstGeom prst="roundRect">
             <a:avLst/>
@@ -11640,17 +11764,18 @@
           </a:effectLst>
         </p:spPr>
         <p:txBody>
-          <a:bodyPr wrap="none" lIns="36000" tIns="0" rIns="72000" bIns="10800" rtlCol="0" anchor="ctr" anchorCtr="1">
+          <a:bodyPr wrap="none" lIns="36000" tIns="0" rIns="36000" bIns="10800" rtlCol="0" anchor="ctr" anchorCtr="1">
             <a:spAutoFit/>
           </a:bodyPr>
           <a:lstStyle/>
           <a:p>
+            <a:pPr algn="ctr"/>
             <a:r>
               <a:rPr lang="en-US" sz="1000" dirty="0" smtClean="0">
                 <a:latin typeface="Arial" panose="020B0604020202020204" pitchFamily="34" charset="0"/>
                 <a:cs typeface="Arial" panose="020B0604020202020204" pitchFamily="34" charset="0"/>
               </a:rPr>
-              <a:t>2. Lookup</a:t>
+              <a:t>Lookup</a:t>
             </a:r>
             <a:endParaRPr lang="en-US" sz="1000" dirty="0">
               <a:latin typeface="Arial" panose="020B0604020202020204" pitchFamily="34" charset="0"/>
@@ -11768,6 +11893,100 @@
             </a:extLst>
           </p:spPr>
         </p:pic>
+      </p:grpSp>
+      <p:grpSp>
+        <p:nvGrpSpPr>
+          <p:cNvPr id="3" name="Group 2"/>
+          <p:cNvGrpSpPr/>
+          <p:nvPr/>
+        </p:nvGrpSpPr>
+        <p:grpSpPr>
+          <a:xfrm>
+            <a:off x="6966772" y="2044800"/>
+            <a:ext cx="354584" cy="246221"/>
+            <a:chOff x="6770900" y="2012786"/>
+            <a:chExt cx="354584" cy="246221"/>
+          </a:xfrm>
+        </p:grpSpPr>
+        <p:sp>
+          <p:nvSpPr>
+            <p:cNvPr id="167" name="Oval 166"/>
+            <p:cNvSpPr/>
+            <p:nvPr/>
+          </p:nvSpPr>
+          <p:spPr>
+            <a:xfrm>
+              <a:off x="6876272" y="2060848"/>
+              <a:ext cx="144000" cy="144000"/>
+            </a:xfrm>
+            <a:prstGeom prst="ellipse">
+              <a:avLst/>
+            </a:prstGeom>
+            <a:solidFill>
+              <a:schemeClr val="bg1"/>
+            </a:solidFill>
+            <a:ln>
+              <a:noFill/>
+            </a:ln>
+          </p:spPr>
+          <p:style>
+            <a:lnRef idx="2">
+              <a:schemeClr val="accent1">
+                <a:shade val="50000"/>
+              </a:schemeClr>
+            </a:lnRef>
+            <a:fillRef idx="1">
+              <a:schemeClr val="accent1"/>
+            </a:fillRef>
+            <a:effectRef idx="0">
+              <a:schemeClr val="accent1"/>
+            </a:effectRef>
+            <a:fontRef idx="minor">
+              <a:schemeClr val="lt1"/>
+            </a:fontRef>
+          </p:style>
+          <p:txBody>
+            <a:bodyPr rtlCol="0" anchor="ctr"/>
+            <a:lstStyle/>
+            <a:p>
+              <a:pPr algn="ctr"/>
+              <a:endParaRPr lang="en-US"/>
+            </a:p>
+          </p:txBody>
+        </p:sp>
+        <p:sp>
+          <p:nvSpPr>
+            <p:cNvPr id="165" name="TextBox 164"/>
+            <p:cNvSpPr txBox="1"/>
+            <p:nvPr/>
+          </p:nvSpPr>
+          <p:spPr>
+            <a:xfrm>
+              <a:off x="6770900" y="2012786"/>
+              <a:ext cx="354584" cy="246221"/>
+            </a:xfrm>
+            <a:prstGeom prst="rect">
+              <a:avLst/>
+            </a:prstGeom>
+            <a:noFill/>
+          </p:spPr>
+          <p:txBody>
+            <a:bodyPr wrap="none" rtlCol="0">
+              <a:spAutoFit/>
+            </a:bodyPr>
+            <a:lstStyle/>
+            <a:p>
+              <a:r>
+                <a:rPr lang="en-US" sz="1000" dirty="0" smtClean="0">
+                  <a:latin typeface="Calibri"/>
+                  <a:sym typeface="Wingdings"/>
+                </a:rPr>
+                <a:t>②</a:t>
+              </a:r>
+              <a:endParaRPr lang="en-US" sz="1000" dirty="0"/>
+            </a:p>
+          </p:txBody>
+        </p:sp>
       </p:grpSp>
     </p:spTree>
     <p:extLst>

</xml_diff>

<commit_message>
Added Wallet / User
</commit_message>
<xml_diff>
--- a/saturn/epi(presumed)-vs-saturn.pptx
+++ b/saturn/epi(presumed)-vs-saturn.pptx
@@ -3238,8 +3238,8 @@
         </p:nvSpPr>
         <p:spPr>
           <a:xfrm>
-            <a:off x="1405252" y="909873"/>
-            <a:ext cx="1897078" cy="3167199"/>
+            <a:off x="1547664" y="909873"/>
+            <a:ext cx="1826674" cy="3167199"/>
           </a:xfrm>
           <a:prstGeom prst="roundRect">
             <a:avLst>
@@ -5810,7 +5810,7 @@
         </p:nvGrpSpPr>
         <p:grpSpPr>
           <a:xfrm>
-            <a:off x="509978" y="2134010"/>
+            <a:off x="700172" y="2134010"/>
             <a:ext cx="557162" cy="447881"/>
             <a:chOff x="3321759" y="524071"/>
             <a:chExt cx="557162" cy="447881"/>
@@ -7044,8 +7044,8 @@
         </p:nvSpPr>
         <p:spPr>
           <a:xfrm>
-            <a:off x="1694886" y="3017411"/>
-            <a:ext cx="1217725" cy="591783"/>
+            <a:off x="1907824" y="3017411"/>
+            <a:ext cx="1080000" cy="591783"/>
           </a:xfrm>
           <a:prstGeom prst="ellipse">
             <a:avLst/>
@@ -7132,8 +7132,8 @@
         </p:nvSpPr>
         <p:spPr>
           <a:xfrm>
-            <a:off x="1694886" y="2095598"/>
-            <a:ext cx="1217725" cy="591783"/>
+            <a:off x="1907824" y="2095598"/>
+            <a:ext cx="1080000" cy="591783"/>
           </a:xfrm>
           <a:prstGeom prst="ellipse">
             <a:avLst/>
@@ -7850,8 +7850,8 @@
         </p:nvSpPr>
         <p:spPr>
           <a:xfrm>
-            <a:off x="1694886" y="1173786"/>
-            <a:ext cx="1217725" cy="591783"/>
+            <a:off x="1907824" y="1173786"/>
+            <a:ext cx="1080000" cy="591783"/>
           </a:xfrm>
           <a:prstGeom prst="ellipse">
             <a:avLst/>
@@ -7938,7 +7938,7 @@
         </p:nvGrpSpPr>
         <p:grpSpPr>
           <a:xfrm>
-            <a:off x="3644718" y="2969523"/>
+            <a:off x="3716726" y="2969523"/>
             <a:ext cx="927282" cy="687559"/>
             <a:chOff x="4013200" y="3014663"/>
             <a:chExt cx="1117600" cy="828675"/>
@@ -8568,7 +8568,7 @@
         </p:nvGrpSpPr>
         <p:grpSpPr>
           <a:xfrm>
-            <a:off x="3644718" y="2047710"/>
+            <a:off x="3716726" y="2047710"/>
             <a:ext cx="927282" cy="687559"/>
             <a:chOff x="4013200" y="3014663"/>
             <a:chExt cx="1117600" cy="828675"/>
@@ -9198,7 +9198,7 @@
         </p:nvGrpSpPr>
         <p:grpSpPr>
           <a:xfrm>
-            <a:off x="3644718" y="1125898"/>
+            <a:off x="3716726" y="1125898"/>
             <a:ext cx="927282" cy="687559"/>
             <a:chOff x="4013200" y="3014663"/>
             <a:chExt cx="1117600" cy="828675"/>
@@ -9828,7 +9828,7 @@
         </p:nvCxnSpPr>
         <p:spPr>
           <a:xfrm>
-            <a:off x="1115616" y="2435973"/>
+            <a:off x="1305810" y="2435973"/>
             <a:ext cx="579270" cy="691610"/>
           </a:xfrm>
           <a:prstGeom prst="straightConnector1">
@@ -9866,7 +9866,7 @@
         </p:nvCxnSpPr>
         <p:spPr>
           <a:xfrm>
-            <a:off x="2987824" y="3313302"/>
+            <a:off x="3059832" y="3313302"/>
             <a:ext cx="656894" cy="1"/>
           </a:xfrm>
           <a:prstGeom prst="straightConnector1">
@@ -9904,7 +9904,7 @@
         </p:nvCxnSpPr>
         <p:spPr>
           <a:xfrm flipV="1">
-            <a:off x="2987824" y="2422042"/>
+            <a:off x="3059832" y="2422042"/>
             <a:ext cx="656894" cy="11660"/>
           </a:xfrm>
           <a:prstGeom prst="straightConnector1">
@@ -9942,7 +9942,7 @@
         </p:nvCxnSpPr>
         <p:spPr>
           <a:xfrm flipV="1">
-            <a:off x="2987824" y="1485939"/>
+            <a:off x="3059832" y="1485939"/>
             <a:ext cx="656894" cy="4957"/>
           </a:xfrm>
           <a:prstGeom prst="straightConnector1">
@@ -9980,7 +9980,7 @@
         </p:nvCxnSpPr>
         <p:spPr>
           <a:xfrm>
-            <a:off x="2987824" y="1625103"/>
+            <a:off x="3059832" y="1625103"/>
             <a:ext cx="648072" cy="690988"/>
           </a:xfrm>
           <a:prstGeom prst="straightConnector1">
@@ -10018,7 +10018,7 @@
         </p:nvCxnSpPr>
         <p:spPr>
           <a:xfrm>
-            <a:off x="2987824" y="2546915"/>
+            <a:off x="3059832" y="2546915"/>
             <a:ext cx="629013" cy="663649"/>
           </a:xfrm>
           <a:prstGeom prst="straightConnector1">
@@ -10056,7 +10056,7 @@
         </p:nvCxnSpPr>
         <p:spPr>
           <a:xfrm flipV="1">
-            <a:off x="2974235" y="1593089"/>
+            <a:off x="3046243" y="1593089"/>
             <a:ext cx="630024" cy="671477"/>
           </a:xfrm>
           <a:prstGeom prst="straightConnector1">
@@ -10094,7 +10094,7 @@
         </p:nvCxnSpPr>
         <p:spPr>
           <a:xfrm>
-            <a:off x="2912611" y="1696230"/>
+            <a:off x="2984619" y="1696230"/>
             <a:ext cx="705237" cy="1372080"/>
           </a:xfrm>
           <a:prstGeom prst="straightConnector1">
@@ -10132,7 +10132,7 @@
         </p:nvCxnSpPr>
         <p:spPr>
           <a:xfrm flipV="1">
-            <a:off x="2968337" y="2546915"/>
+            <a:off x="3040345" y="2546915"/>
             <a:ext cx="648500" cy="638242"/>
           </a:xfrm>
           <a:prstGeom prst="straightConnector1">
@@ -10170,7 +10170,7 @@
         </p:nvCxnSpPr>
         <p:spPr>
           <a:xfrm flipV="1">
-            <a:off x="2843808" y="1731169"/>
+            <a:off x="2915816" y="1731169"/>
             <a:ext cx="753070" cy="1337142"/>
           </a:xfrm>
           <a:prstGeom prst="straightConnector1">
@@ -10249,7 +10249,7 @@
         </p:nvSpPr>
         <p:spPr>
           <a:xfrm>
-            <a:off x="380354" y="1852063"/>
+            <a:off x="570548" y="1852063"/>
             <a:ext cx="824265" cy="276999"/>
           </a:xfrm>
           <a:prstGeom prst="rect">
@@ -10397,7 +10397,7 @@
         </p:nvSpPr>
         <p:spPr>
           <a:xfrm>
-            <a:off x="1556268" y="3773858"/>
+            <a:off x="1664438" y="3773858"/>
             <a:ext cx="1592103" cy="276999"/>
           </a:xfrm>
           <a:prstGeom prst="rect">
@@ -10724,11 +10724,18 @@
               <a:t>from the </a:t>
             </a:r>
             <a:r>
+              <a:rPr lang="en-US" sz="1000" dirty="0" smtClean="0">
+                <a:latin typeface="Arial" panose="020B0604020202020204" pitchFamily="34" charset="0"/>
+                <a:cs typeface="Arial" panose="020B0604020202020204" pitchFamily="34" charset="0"/>
+              </a:rPr>
+              <a:t>Merchant </a:t>
+            </a:r>
+            <a:r>
               <a:rPr lang="en-US" sz="1000" dirty="0">
                 <a:latin typeface="Arial" panose="020B0604020202020204" pitchFamily="34" charset="0"/>
                 <a:cs typeface="Arial" panose="020B0604020202020204" pitchFamily="34" charset="0"/>
               </a:rPr>
-              <a:t>(not shown here) Merchant and User authorization </a:t>
+              <a:t>and User authorization </a:t>
             </a:r>
             <a:r>
               <a:rPr lang="en-US" sz="1000" dirty="0" smtClean="0">
@@ -10777,14 +10784,7 @@
                 <a:latin typeface="Arial" panose="020B0604020202020204" pitchFamily="34" charset="0"/>
                 <a:cs typeface="Arial" panose="020B0604020202020204" pitchFamily="34" charset="0"/>
               </a:rPr>
-              <a:t>The </a:t>
-            </a:r>
-            <a:r>
-              <a:rPr lang="en-US" sz="1000" dirty="0" smtClean="0">
-                <a:latin typeface="Arial" panose="020B0604020202020204" pitchFamily="34" charset="0"/>
-                <a:cs typeface="Arial" panose="020B0604020202020204" pitchFamily="34" charset="0"/>
-              </a:rPr>
-              <a:t>arrows in the diagram are </a:t>
+              <a:t>The arrows in the diagram are </a:t>
             </a:r>
             <a:r>
               <a:rPr lang="en-US" sz="1000" i="1" dirty="0" smtClean="0">
@@ -11506,8 +11506,8 @@
         </p:nvSpPr>
         <p:spPr>
           <a:xfrm>
-            <a:off x="6455756" y="3007198"/>
-            <a:ext cx="360000" cy="360000"/>
+            <a:off x="6414461" y="3007198"/>
+            <a:ext cx="324000" cy="324000"/>
           </a:xfrm>
           <a:prstGeom prst="ellipse">
             <a:avLst/>
@@ -11597,8 +11597,8 @@
         </p:nvCxnSpPr>
         <p:spPr>
           <a:xfrm flipH="1">
-            <a:off x="6732240" y="1593089"/>
-            <a:ext cx="720080" cy="1376434"/>
+            <a:off x="6705600" y="1593089"/>
+            <a:ext cx="746720" cy="1408416"/>
           </a:xfrm>
           <a:prstGeom prst="straightConnector1">
             <a:avLst/>
@@ -11637,7 +11637,7 @@
         <p:spPr>
           <a:xfrm>
             <a:off x="-5832" y="6654442"/>
-            <a:ext cx="2345514" cy="215444"/>
+            <a:ext cx="2432076" cy="215444"/>
           </a:xfrm>
           <a:prstGeom prst="rect">
             <a:avLst/>
@@ -11655,21 +11655,14 @@
                 <a:latin typeface="Arial" panose="020B0604020202020204" pitchFamily="34" charset="0"/>
                 <a:cs typeface="Arial" panose="020B0604020202020204" pitchFamily="34" charset="0"/>
               </a:rPr>
-              <a:t>EPI (Presumed) versus Saturn</a:t>
+              <a:t>EPI (Presumed) versus Saturn, </a:t>
             </a:r>
             <a:r>
-              <a:rPr lang="en-US" sz="800" smtClean="0">
+              <a:rPr lang="en-US" sz="800" dirty="0" smtClean="0">
                 <a:latin typeface="Arial" panose="020B0604020202020204" pitchFamily="34" charset="0"/>
                 <a:cs typeface="Arial" panose="020B0604020202020204" pitchFamily="34" charset="0"/>
               </a:rPr>
-              <a:t>, </a:t>
-            </a:r>
-            <a:r>
-              <a:rPr lang="en-US" sz="800" smtClean="0">
-                <a:latin typeface="Arial" panose="020B0604020202020204" pitchFamily="34" charset="0"/>
-                <a:cs typeface="Arial" panose="020B0604020202020204" pitchFamily="34" charset="0"/>
-              </a:rPr>
-              <a:t>AR-2020-11-27</a:t>
+              <a:t>AR-2020-11-27:3</a:t>
             </a:r>
             <a:endParaRPr lang="en-US" sz="800" dirty="0">
               <a:latin typeface="Arial" panose="020B0604020202020204" pitchFamily="34" charset="0"/>
@@ -11792,7 +11785,7 @@
         </p:nvGrpSpPr>
         <p:grpSpPr>
           <a:xfrm>
-            <a:off x="6670563" y="3293368"/>
+            <a:off x="6629268" y="3257190"/>
             <a:ext cx="288000" cy="315826"/>
             <a:chOff x="7439528" y="2941466"/>
             <a:chExt cx="216024" cy="262996"/>
@@ -11988,6 +11981,920 @@
           </p:txBody>
         </p:sp>
       </p:grpSp>
+      <p:pic>
+        <p:nvPicPr>
+          <p:cNvPr id="170" name="Picture 6" descr="C:\Users\Anders\AppData\Local\Microsoft\Windows\INetCache\IE\10FYNQXY\Crystal_Clear_kdm_user_female[1].png"/>
+          <p:cNvPicPr>
+            <a:picLocks noChangeAspect="1" noChangeArrowheads="1"/>
+          </p:cNvPicPr>
+          <p:nvPr/>
+        </p:nvPicPr>
+        <p:blipFill>
+          <a:blip r:embed="rId5" cstate="print">
+            <a:extLst>
+              <a:ext uri="{28A0092B-C50C-407E-A947-70E740481C1C}">
+                <a14:useLocalDpi xmlns:a14="http://schemas.microsoft.com/office/drawing/2010/main" val="0"/>
+              </a:ext>
+            </a:extLst>
+          </a:blip>
+          <a:srcRect/>
+          <a:stretch>
+            <a:fillRect/>
+          </a:stretch>
+        </p:blipFill>
+        <p:spPr bwMode="auto">
+          <a:xfrm>
+            <a:off x="5703998" y="1086247"/>
+            <a:ext cx="540000" cy="540000"/>
+          </a:xfrm>
+          <a:prstGeom prst="rect">
+            <a:avLst/>
+          </a:prstGeom>
+          <a:noFill/>
+          <a:effectLst>
+            <a:outerShdw blurRad="50800" dist="38100" dir="2700000" algn="tl" rotWithShape="0">
+              <a:prstClr val="black">
+                <a:alpha val="40000"/>
+              </a:prstClr>
+            </a:outerShdw>
+          </a:effectLst>
+          <a:extLst>
+            <a:ext uri="{909E8E84-426E-40DD-AFC4-6F175D3DCCD1}">
+              <a14:hiddenFill xmlns:a14="http://schemas.microsoft.com/office/drawing/2010/main">
+                <a:solidFill>
+                  <a:srgbClr val="FFFFFF"/>
+                </a:solidFill>
+              </a14:hiddenFill>
+            </a:ext>
+          </a:extLst>
+        </p:spPr>
+      </p:pic>
+      <p:grpSp>
+        <p:nvGrpSpPr>
+          <p:cNvPr id="179" name="Group 178"/>
+          <p:cNvGrpSpPr/>
+          <p:nvPr/>
+        </p:nvGrpSpPr>
+        <p:grpSpPr>
+          <a:xfrm>
+            <a:off x="5323300" y="1160800"/>
+            <a:ext cx="359900" cy="468000"/>
+            <a:chOff x="5523510" y="2050055"/>
+            <a:chExt cx="359900" cy="502719"/>
+          </a:xfrm>
+        </p:grpSpPr>
+        <p:pic>
+          <p:nvPicPr>
+            <p:cNvPr id="180" name="Picture 4" descr="C:\Users\Anders\AppData\Local\Microsoft\Windows\INetCache\IE\YM8GPEOA\mobile[1].png"/>
+            <p:cNvPicPr>
+              <a:picLocks noChangeAspect="1" noChangeArrowheads="1"/>
+            </p:cNvPicPr>
+            <p:nvPr/>
+          </p:nvPicPr>
+          <p:blipFill>
+            <a:blip r:embed="rId6" cstate="print">
+              <a:extLst>
+                <a:ext uri="{28A0092B-C50C-407E-A947-70E740481C1C}">
+                  <a14:useLocalDpi xmlns:a14="http://schemas.microsoft.com/office/drawing/2010/main" val="0"/>
+                </a:ext>
+              </a:extLst>
+            </a:blip>
+            <a:srcRect/>
+            <a:stretch>
+              <a:fillRect/>
+            </a:stretch>
+          </p:blipFill>
+          <p:spPr bwMode="auto">
+            <a:xfrm rot="10800000">
+              <a:off x="5527737" y="2050055"/>
+              <a:ext cx="355673" cy="502719"/>
+            </a:xfrm>
+            <a:prstGeom prst="rect">
+              <a:avLst/>
+            </a:prstGeom>
+            <a:noFill/>
+            <a:effectLst>
+              <a:outerShdw blurRad="50800" dist="38100" dir="2700000" algn="tl" rotWithShape="0">
+                <a:prstClr val="black">
+                  <a:alpha val="40000"/>
+                </a:prstClr>
+              </a:outerShdw>
+            </a:effectLst>
+            <a:extLst>
+              <a:ext uri="{909E8E84-426E-40DD-AFC4-6F175D3DCCD1}">
+                <a14:hiddenFill xmlns:a14="http://schemas.microsoft.com/office/drawing/2010/main">
+                  <a:solidFill>
+                    <a:srgbClr val="FFFFFF"/>
+                  </a:solidFill>
+                </a14:hiddenFill>
+              </a:ext>
+            </a:extLst>
+          </p:spPr>
+        </p:pic>
+        <p:sp>
+          <p:nvSpPr>
+            <p:cNvPr id="181" name="Rectangle 180"/>
+            <p:cNvSpPr/>
+            <p:nvPr/>
+          </p:nvSpPr>
+          <p:spPr>
+            <a:xfrm>
+              <a:off x="5591696" y="2129999"/>
+              <a:ext cx="219600" cy="345600"/>
+            </a:xfrm>
+            <a:prstGeom prst="rect">
+              <a:avLst/>
+            </a:prstGeom>
+            <a:solidFill>
+              <a:schemeClr val="bg1"/>
+            </a:solidFill>
+            <a:ln>
+              <a:noFill/>
+            </a:ln>
+          </p:spPr>
+          <p:style>
+            <a:lnRef idx="2">
+              <a:schemeClr val="accent1">
+                <a:shade val="50000"/>
+              </a:schemeClr>
+            </a:lnRef>
+            <a:fillRef idx="1">
+              <a:schemeClr val="accent1"/>
+            </a:fillRef>
+            <a:effectRef idx="0">
+              <a:schemeClr val="accent1"/>
+            </a:effectRef>
+            <a:fontRef idx="minor">
+              <a:schemeClr val="lt1"/>
+            </a:fontRef>
+          </p:style>
+          <p:txBody>
+            <a:bodyPr rtlCol="0" anchor="ctr"/>
+            <a:lstStyle/>
+            <a:p>
+              <a:pPr algn="ctr"/>
+              <a:endParaRPr lang="en-US"/>
+            </a:p>
+          </p:txBody>
+        </p:sp>
+        <p:sp>
+          <p:nvSpPr>
+            <p:cNvPr id="182" name="TextBox 181"/>
+            <p:cNvSpPr txBox="1"/>
+            <p:nvPr/>
+          </p:nvSpPr>
+          <p:spPr>
+            <a:xfrm>
+              <a:off x="5523510" y="2114240"/>
+              <a:ext cx="357790" cy="184666"/>
+            </a:xfrm>
+            <a:prstGeom prst="rect">
+              <a:avLst/>
+            </a:prstGeom>
+            <a:noFill/>
+          </p:spPr>
+          <p:txBody>
+            <a:bodyPr wrap="none" rtlCol="0">
+              <a:spAutoFit/>
+            </a:bodyPr>
+            <a:lstStyle/>
+            <a:p>
+              <a:r>
+                <a:rPr lang="en-US" sz="600" dirty="0" smtClean="0">
+                  <a:latin typeface="Arial" panose="020B0604020202020204" pitchFamily="34" charset="0"/>
+                  <a:cs typeface="Arial" panose="020B0604020202020204" pitchFamily="34" charset="0"/>
+                </a:rPr>
+                <a:t>€100</a:t>
+              </a:r>
+              <a:endParaRPr lang="en-US" sz="600" dirty="0">
+                <a:latin typeface="Arial" panose="020B0604020202020204" pitchFamily="34" charset="0"/>
+                <a:cs typeface="Arial" panose="020B0604020202020204" pitchFamily="34" charset="0"/>
+              </a:endParaRPr>
+            </a:p>
+          </p:txBody>
+        </p:sp>
+        <p:grpSp>
+          <p:nvGrpSpPr>
+            <p:cNvPr id="184" name="Group 183"/>
+            <p:cNvGrpSpPr/>
+            <p:nvPr/>
+          </p:nvGrpSpPr>
+          <p:grpSpPr>
+            <a:xfrm>
+              <a:off x="5659747" y="2347454"/>
+              <a:ext cx="72000" cy="72000"/>
+              <a:chOff x="7812386" y="2253126"/>
+              <a:chExt cx="144016" cy="144016"/>
+            </a:xfrm>
+          </p:grpSpPr>
+          <p:sp>
+            <p:nvSpPr>
+              <p:cNvPr id="185" name="Rectangle 184"/>
+              <p:cNvSpPr/>
+              <p:nvPr/>
+            </p:nvSpPr>
+            <p:spPr>
+              <a:xfrm>
+                <a:off x="7812386" y="2253126"/>
+                <a:ext cx="144016" cy="144016"/>
+              </a:xfrm>
+              <a:prstGeom prst="rect">
+                <a:avLst/>
+              </a:prstGeom>
+              <a:solidFill>
+                <a:schemeClr val="bg2"/>
+              </a:solidFill>
+              <a:ln w="6350">
+                <a:solidFill>
+                  <a:schemeClr val="accent1">
+                    <a:shade val="50000"/>
+                  </a:schemeClr>
+                </a:solidFill>
+              </a:ln>
+            </p:spPr>
+            <p:style>
+              <a:lnRef idx="2">
+                <a:schemeClr val="accent1">
+                  <a:shade val="50000"/>
+                </a:schemeClr>
+              </a:lnRef>
+              <a:fillRef idx="1">
+                <a:schemeClr val="accent1"/>
+              </a:fillRef>
+              <a:effectRef idx="0">
+                <a:schemeClr val="accent1"/>
+              </a:effectRef>
+              <a:fontRef idx="minor">
+                <a:schemeClr val="lt1"/>
+              </a:fontRef>
+            </p:style>
+            <p:txBody>
+              <a:bodyPr rtlCol="0" anchor="ctr"/>
+              <a:lstStyle/>
+              <a:p>
+                <a:pPr algn="ctr"/>
+                <a:endParaRPr lang="en-US"/>
+              </a:p>
+            </p:txBody>
+          </p:sp>
+          <p:sp>
+            <p:nvSpPr>
+              <p:cNvPr id="186" name="Rectangle 185"/>
+              <p:cNvSpPr/>
+              <p:nvPr/>
+            </p:nvSpPr>
+            <p:spPr>
+              <a:xfrm>
+                <a:off x="7855725" y="2293359"/>
+                <a:ext cx="61201" cy="61201"/>
+              </a:xfrm>
+              <a:prstGeom prst="rect">
+                <a:avLst/>
+              </a:prstGeom>
+              <a:solidFill>
+                <a:schemeClr val="bg2"/>
+              </a:solidFill>
+              <a:ln w="6350">
+                <a:solidFill>
+                  <a:schemeClr val="accent1">
+                    <a:shade val="50000"/>
+                  </a:schemeClr>
+                </a:solidFill>
+              </a:ln>
+            </p:spPr>
+            <p:style>
+              <a:lnRef idx="2">
+                <a:schemeClr val="accent1">
+                  <a:shade val="50000"/>
+                </a:schemeClr>
+              </a:lnRef>
+              <a:fillRef idx="1">
+                <a:schemeClr val="accent1"/>
+              </a:fillRef>
+              <a:effectRef idx="0">
+                <a:schemeClr val="accent1"/>
+              </a:effectRef>
+              <a:fontRef idx="minor">
+                <a:schemeClr val="lt1"/>
+              </a:fontRef>
+            </p:style>
+            <p:txBody>
+              <a:bodyPr rtlCol="0" anchor="ctr"/>
+              <a:lstStyle/>
+              <a:p>
+                <a:pPr algn="ctr"/>
+                <a:endParaRPr lang="en-US"/>
+              </a:p>
+            </p:txBody>
+          </p:sp>
+        </p:grpSp>
+      </p:grpSp>
+      <p:sp>
+        <p:nvSpPr>
+          <p:cNvPr id="12" name="Rectangle 11"/>
+          <p:cNvSpPr/>
+          <p:nvPr/>
+        </p:nvSpPr>
+        <p:spPr>
+          <a:xfrm>
+            <a:off x="5508103" y="1696230"/>
+            <a:ext cx="183867" cy="724658"/>
+          </a:xfrm>
+          <a:custGeom>
+            <a:avLst/>
+            <a:gdLst>
+              <a:gd name="connsiteX0" fmla="*/ 0 w 288032"/>
+              <a:gd name="connsiteY0" fmla="*/ 0 h 307740"/>
+              <a:gd name="connsiteX1" fmla="*/ 288032 w 288032"/>
+              <a:gd name="connsiteY1" fmla="*/ 0 h 307740"/>
+              <a:gd name="connsiteX2" fmla="*/ 288032 w 288032"/>
+              <a:gd name="connsiteY2" fmla="*/ 307740 h 307740"/>
+              <a:gd name="connsiteX3" fmla="*/ 0 w 288032"/>
+              <a:gd name="connsiteY3" fmla="*/ 307740 h 307740"/>
+              <a:gd name="connsiteX4" fmla="*/ 0 w 288032"/>
+              <a:gd name="connsiteY4" fmla="*/ 0 h 307740"/>
+              <a:gd name="connsiteX0" fmla="*/ 288032 w 379472"/>
+              <a:gd name="connsiteY0" fmla="*/ 0 h 307740"/>
+              <a:gd name="connsiteX1" fmla="*/ 288032 w 379472"/>
+              <a:gd name="connsiteY1" fmla="*/ 307740 h 307740"/>
+              <a:gd name="connsiteX2" fmla="*/ 0 w 379472"/>
+              <a:gd name="connsiteY2" fmla="*/ 307740 h 307740"/>
+              <a:gd name="connsiteX3" fmla="*/ 0 w 379472"/>
+              <a:gd name="connsiteY3" fmla="*/ 0 h 307740"/>
+              <a:gd name="connsiteX4" fmla="*/ 379472 w 379472"/>
+              <a:gd name="connsiteY4" fmla="*/ 91440 h 307740"/>
+              <a:gd name="connsiteX0" fmla="*/ 288032 w 288032"/>
+              <a:gd name="connsiteY0" fmla="*/ 0 h 307740"/>
+              <a:gd name="connsiteX1" fmla="*/ 288032 w 288032"/>
+              <a:gd name="connsiteY1" fmla="*/ 307740 h 307740"/>
+              <a:gd name="connsiteX2" fmla="*/ 0 w 288032"/>
+              <a:gd name="connsiteY2" fmla="*/ 307740 h 307740"/>
+              <a:gd name="connsiteX3" fmla="*/ 0 w 288032"/>
+              <a:gd name="connsiteY3" fmla="*/ 0 h 307740"/>
+              <a:gd name="connsiteX0" fmla="*/ 288032 w 288032"/>
+              <a:gd name="connsiteY0" fmla="*/ 307740 h 307740"/>
+              <a:gd name="connsiteX1" fmla="*/ 0 w 288032"/>
+              <a:gd name="connsiteY1" fmla="*/ 307740 h 307740"/>
+              <a:gd name="connsiteX2" fmla="*/ 0 w 288032"/>
+              <a:gd name="connsiteY2" fmla="*/ 0 h 307740"/>
+            </a:gdLst>
+            <a:ahLst/>
+            <a:cxnLst>
+              <a:cxn ang="0">
+                <a:pos x="connsiteX0" y="connsiteY0"/>
+              </a:cxn>
+              <a:cxn ang="0">
+                <a:pos x="connsiteX1" y="connsiteY1"/>
+              </a:cxn>
+              <a:cxn ang="0">
+                <a:pos x="connsiteX2" y="connsiteY2"/>
+              </a:cxn>
+            </a:cxnLst>
+            <a:rect l="l" t="t" r="r" b="b"/>
+            <a:pathLst>
+              <a:path w="288032" h="307740">
+                <a:moveTo>
+                  <a:pt x="288032" y="307740"/>
+                </a:moveTo>
+                <a:lnTo>
+                  <a:pt x="0" y="307740"/>
+                </a:lnTo>
+                <a:lnTo>
+                  <a:pt x="0" y="0"/>
+                </a:lnTo>
+              </a:path>
+            </a:pathLst>
+          </a:custGeom>
+          <a:noFill/>
+          <a:ln w="9525">
+            <a:solidFill>
+              <a:schemeClr val="bg1">
+                <a:lumMod val="50000"/>
+              </a:schemeClr>
+            </a:solidFill>
+            <a:prstDash val="sysDash"/>
+            <a:headEnd type="triangle" w="sm" len="sm"/>
+          </a:ln>
+        </p:spPr>
+        <p:style>
+          <a:lnRef idx="2">
+            <a:schemeClr val="accent1">
+              <a:shade val="50000"/>
+            </a:schemeClr>
+          </a:lnRef>
+          <a:fillRef idx="1">
+            <a:schemeClr val="accent1"/>
+          </a:fillRef>
+          <a:effectRef idx="0">
+            <a:schemeClr val="accent1"/>
+          </a:effectRef>
+          <a:fontRef idx="minor">
+            <a:schemeClr val="lt1"/>
+          </a:fontRef>
+        </p:style>
+        <p:txBody>
+          <a:bodyPr rtlCol="0" anchor="ctr"/>
+          <a:lstStyle/>
+          <a:p>
+            <a:pPr algn="ctr"/>
+            <a:endParaRPr lang="en-US"/>
+          </a:p>
+        </p:txBody>
+      </p:sp>
+      <p:sp>
+        <p:nvSpPr>
+          <p:cNvPr id="188" name="TextBox 187"/>
+          <p:cNvSpPr txBox="1"/>
+          <p:nvPr/>
+        </p:nvSpPr>
+        <p:spPr>
+          <a:xfrm>
+            <a:off x="5184990" y="777600"/>
+            <a:ext cx="1059008" cy="276999"/>
+          </a:xfrm>
+          <a:prstGeom prst="rect">
+            <a:avLst/>
+          </a:prstGeom>
+          <a:noFill/>
+        </p:spPr>
+        <p:txBody>
+          <a:bodyPr wrap="none" rtlCol="0">
+            <a:spAutoFit/>
+          </a:bodyPr>
+          <a:lstStyle/>
+          <a:p>
+            <a:pPr algn="ctr"/>
+            <a:r>
+              <a:rPr lang="en-US" sz="1200" dirty="0" smtClean="0">
+                <a:latin typeface="Arial" panose="020B0604020202020204" pitchFamily="34" charset="0"/>
+                <a:cs typeface="Arial" panose="020B0604020202020204" pitchFamily="34" charset="0"/>
+              </a:rPr>
+              <a:t>Wallet / User</a:t>
+            </a:r>
+            <a:endParaRPr lang="en-US" sz="1200" dirty="0">
+              <a:latin typeface="Arial" panose="020B0604020202020204" pitchFamily="34" charset="0"/>
+              <a:cs typeface="Arial" panose="020B0604020202020204" pitchFamily="34" charset="0"/>
+            </a:endParaRPr>
+          </a:p>
+        </p:txBody>
+      </p:sp>
+      <p:pic>
+        <p:nvPicPr>
+          <p:cNvPr id="189" name="Picture 6" descr="C:\Users\Anders\AppData\Local\Microsoft\Windows\INetCache\IE\10FYNQXY\Crystal_Clear_kdm_user_female[1].png"/>
+          <p:cNvPicPr>
+            <a:picLocks noChangeAspect="1" noChangeArrowheads="1"/>
+          </p:cNvPicPr>
+          <p:nvPr/>
+        </p:nvPicPr>
+        <p:blipFill>
+          <a:blip r:embed="rId5" cstate="print">
+            <a:extLst>
+              <a:ext uri="{28A0092B-C50C-407E-A947-70E740481C1C}">
+                <a14:useLocalDpi xmlns:a14="http://schemas.microsoft.com/office/drawing/2010/main" val="0"/>
+              </a:ext>
+            </a:extLst>
+          </a:blip>
+          <a:srcRect/>
+          <a:stretch>
+            <a:fillRect/>
+          </a:stretch>
+        </p:blipFill>
+        <p:spPr bwMode="auto">
+          <a:xfrm>
+            <a:off x="698520" y="1073351"/>
+            <a:ext cx="540000" cy="540000"/>
+          </a:xfrm>
+          <a:prstGeom prst="rect">
+            <a:avLst/>
+          </a:prstGeom>
+          <a:noFill/>
+          <a:effectLst>
+            <a:outerShdw blurRad="50800" dist="38100" dir="2700000" algn="tl" rotWithShape="0">
+              <a:prstClr val="black">
+                <a:alpha val="40000"/>
+              </a:prstClr>
+            </a:outerShdw>
+          </a:effectLst>
+          <a:extLst>
+            <a:ext uri="{909E8E84-426E-40DD-AFC4-6F175D3DCCD1}">
+              <a14:hiddenFill xmlns:a14="http://schemas.microsoft.com/office/drawing/2010/main">
+                <a:solidFill>
+                  <a:srgbClr val="FFFFFF"/>
+                </a:solidFill>
+              </a14:hiddenFill>
+            </a:ext>
+          </a:extLst>
+        </p:spPr>
+      </p:pic>
+      <p:grpSp>
+        <p:nvGrpSpPr>
+          <p:cNvPr id="190" name="Group 189"/>
+          <p:cNvGrpSpPr/>
+          <p:nvPr/>
+        </p:nvGrpSpPr>
+        <p:grpSpPr>
+          <a:xfrm>
+            <a:off x="317822" y="1147904"/>
+            <a:ext cx="359900" cy="468000"/>
+            <a:chOff x="5523510" y="2050055"/>
+            <a:chExt cx="359900" cy="502719"/>
+          </a:xfrm>
+        </p:grpSpPr>
+        <p:pic>
+          <p:nvPicPr>
+            <p:cNvPr id="191" name="Picture 4" descr="C:\Users\Anders\AppData\Local\Microsoft\Windows\INetCache\IE\YM8GPEOA\mobile[1].png"/>
+            <p:cNvPicPr>
+              <a:picLocks noChangeAspect="1" noChangeArrowheads="1"/>
+            </p:cNvPicPr>
+            <p:nvPr/>
+          </p:nvPicPr>
+          <p:blipFill>
+            <a:blip r:embed="rId6" cstate="print">
+              <a:extLst>
+                <a:ext uri="{28A0092B-C50C-407E-A947-70E740481C1C}">
+                  <a14:useLocalDpi xmlns:a14="http://schemas.microsoft.com/office/drawing/2010/main" val="0"/>
+                </a:ext>
+              </a:extLst>
+            </a:blip>
+            <a:srcRect/>
+            <a:stretch>
+              <a:fillRect/>
+            </a:stretch>
+          </p:blipFill>
+          <p:spPr bwMode="auto">
+            <a:xfrm rot="10800000">
+              <a:off x="5527737" y="2050055"/>
+              <a:ext cx="355673" cy="502719"/>
+            </a:xfrm>
+            <a:prstGeom prst="rect">
+              <a:avLst/>
+            </a:prstGeom>
+            <a:noFill/>
+            <a:effectLst>
+              <a:outerShdw blurRad="50800" dist="38100" dir="2700000" algn="tl" rotWithShape="0">
+                <a:prstClr val="black">
+                  <a:alpha val="40000"/>
+                </a:prstClr>
+              </a:outerShdw>
+            </a:effectLst>
+            <a:extLst>
+              <a:ext uri="{909E8E84-426E-40DD-AFC4-6F175D3DCCD1}">
+                <a14:hiddenFill xmlns:a14="http://schemas.microsoft.com/office/drawing/2010/main">
+                  <a:solidFill>
+                    <a:srgbClr val="FFFFFF"/>
+                  </a:solidFill>
+                </a14:hiddenFill>
+              </a:ext>
+            </a:extLst>
+          </p:spPr>
+        </p:pic>
+        <p:sp>
+          <p:nvSpPr>
+            <p:cNvPr id="192" name="Rectangle 191"/>
+            <p:cNvSpPr/>
+            <p:nvPr/>
+          </p:nvSpPr>
+          <p:spPr>
+            <a:xfrm>
+              <a:off x="5591696" y="2129999"/>
+              <a:ext cx="219600" cy="345600"/>
+            </a:xfrm>
+            <a:prstGeom prst="rect">
+              <a:avLst/>
+            </a:prstGeom>
+            <a:solidFill>
+              <a:schemeClr val="bg1"/>
+            </a:solidFill>
+            <a:ln>
+              <a:noFill/>
+            </a:ln>
+          </p:spPr>
+          <p:style>
+            <a:lnRef idx="2">
+              <a:schemeClr val="accent1">
+                <a:shade val="50000"/>
+              </a:schemeClr>
+            </a:lnRef>
+            <a:fillRef idx="1">
+              <a:schemeClr val="accent1"/>
+            </a:fillRef>
+            <a:effectRef idx="0">
+              <a:schemeClr val="accent1"/>
+            </a:effectRef>
+            <a:fontRef idx="minor">
+              <a:schemeClr val="lt1"/>
+            </a:fontRef>
+          </p:style>
+          <p:txBody>
+            <a:bodyPr rtlCol="0" anchor="ctr"/>
+            <a:lstStyle/>
+            <a:p>
+              <a:pPr algn="ctr"/>
+              <a:endParaRPr lang="en-US"/>
+            </a:p>
+          </p:txBody>
+        </p:sp>
+        <p:sp>
+          <p:nvSpPr>
+            <p:cNvPr id="193" name="TextBox 192"/>
+            <p:cNvSpPr txBox="1"/>
+            <p:nvPr/>
+          </p:nvSpPr>
+          <p:spPr>
+            <a:xfrm>
+              <a:off x="5523510" y="2114240"/>
+              <a:ext cx="357790" cy="184666"/>
+            </a:xfrm>
+            <a:prstGeom prst="rect">
+              <a:avLst/>
+            </a:prstGeom>
+            <a:noFill/>
+          </p:spPr>
+          <p:txBody>
+            <a:bodyPr wrap="none" rtlCol="0">
+              <a:spAutoFit/>
+            </a:bodyPr>
+            <a:lstStyle/>
+            <a:p>
+              <a:r>
+                <a:rPr lang="en-US" sz="600" dirty="0" smtClean="0">
+                  <a:latin typeface="Arial" panose="020B0604020202020204" pitchFamily="34" charset="0"/>
+                  <a:cs typeface="Arial" panose="020B0604020202020204" pitchFamily="34" charset="0"/>
+                </a:rPr>
+                <a:t>€100</a:t>
+              </a:r>
+              <a:endParaRPr lang="en-US" sz="600" dirty="0">
+                <a:latin typeface="Arial" panose="020B0604020202020204" pitchFamily="34" charset="0"/>
+                <a:cs typeface="Arial" panose="020B0604020202020204" pitchFamily="34" charset="0"/>
+              </a:endParaRPr>
+            </a:p>
+          </p:txBody>
+        </p:sp>
+        <p:grpSp>
+          <p:nvGrpSpPr>
+            <p:cNvPr id="194" name="Group 193"/>
+            <p:cNvGrpSpPr/>
+            <p:nvPr/>
+          </p:nvGrpSpPr>
+          <p:grpSpPr>
+            <a:xfrm>
+              <a:off x="5659747" y="2347454"/>
+              <a:ext cx="72000" cy="72000"/>
+              <a:chOff x="7812386" y="2253126"/>
+              <a:chExt cx="144016" cy="144016"/>
+            </a:xfrm>
+          </p:grpSpPr>
+          <p:sp>
+            <p:nvSpPr>
+              <p:cNvPr id="195" name="Rectangle 194"/>
+              <p:cNvSpPr/>
+              <p:nvPr/>
+            </p:nvSpPr>
+            <p:spPr>
+              <a:xfrm>
+                <a:off x="7812386" y="2253126"/>
+                <a:ext cx="144016" cy="144016"/>
+              </a:xfrm>
+              <a:prstGeom prst="rect">
+                <a:avLst/>
+              </a:prstGeom>
+              <a:solidFill>
+                <a:schemeClr val="bg2"/>
+              </a:solidFill>
+              <a:ln w="6350">
+                <a:solidFill>
+                  <a:schemeClr val="accent1">
+                    <a:shade val="50000"/>
+                  </a:schemeClr>
+                </a:solidFill>
+              </a:ln>
+            </p:spPr>
+            <p:style>
+              <a:lnRef idx="2">
+                <a:schemeClr val="accent1">
+                  <a:shade val="50000"/>
+                </a:schemeClr>
+              </a:lnRef>
+              <a:fillRef idx="1">
+                <a:schemeClr val="accent1"/>
+              </a:fillRef>
+              <a:effectRef idx="0">
+                <a:schemeClr val="accent1"/>
+              </a:effectRef>
+              <a:fontRef idx="minor">
+                <a:schemeClr val="lt1"/>
+              </a:fontRef>
+            </p:style>
+            <p:txBody>
+              <a:bodyPr rtlCol="0" anchor="ctr"/>
+              <a:lstStyle/>
+              <a:p>
+                <a:pPr algn="ctr"/>
+                <a:endParaRPr lang="en-US"/>
+              </a:p>
+            </p:txBody>
+          </p:sp>
+          <p:sp>
+            <p:nvSpPr>
+              <p:cNvPr id="196" name="Rectangle 195"/>
+              <p:cNvSpPr/>
+              <p:nvPr/>
+            </p:nvSpPr>
+            <p:spPr>
+              <a:xfrm>
+                <a:off x="7855725" y="2293359"/>
+                <a:ext cx="61201" cy="61201"/>
+              </a:xfrm>
+              <a:prstGeom prst="rect">
+                <a:avLst/>
+              </a:prstGeom>
+              <a:solidFill>
+                <a:schemeClr val="bg2"/>
+              </a:solidFill>
+              <a:ln w="6350">
+                <a:solidFill>
+                  <a:schemeClr val="accent1">
+                    <a:shade val="50000"/>
+                  </a:schemeClr>
+                </a:solidFill>
+              </a:ln>
+            </p:spPr>
+            <p:style>
+              <a:lnRef idx="2">
+                <a:schemeClr val="accent1">
+                  <a:shade val="50000"/>
+                </a:schemeClr>
+              </a:lnRef>
+              <a:fillRef idx="1">
+                <a:schemeClr val="accent1"/>
+              </a:fillRef>
+              <a:effectRef idx="0">
+                <a:schemeClr val="accent1"/>
+              </a:effectRef>
+              <a:fontRef idx="minor">
+                <a:schemeClr val="lt1"/>
+              </a:fontRef>
+            </p:style>
+            <p:txBody>
+              <a:bodyPr rtlCol="0" anchor="ctr"/>
+              <a:lstStyle/>
+              <a:p>
+                <a:pPr algn="ctr"/>
+                <a:endParaRPr lang="en-US"/>
+              </a:p>
+            </p:txBody>
+          </p:sp>
+        </p:grpSp>
+      </p:grpSp>
+      <p:sp>
+        <p:nvSpPr>
+          <p:cNvPr id="197" name="Rectangle 11"/>
+          <p:cNvSpPr/>
+          <p:nvPr/>
+        </p:nvSpPr>
+        <p:spPr>
+          <a:xfrm>
+            <a:off x="502625" y="1683334"/>
+            <a:ext cx="183867" cy="724658"/>
+          </a:xfrm>
+          <a:custGeom>
+            <a:avLst/>
+            <a:gdLst>
+              <a:gd name="connsiteX0" fmla="*/ 0 w 288032"/>
+              <a:gd name="connsiteY0" fmla="*/ 0 h 307740"/>
+              <a:gd name="connsiteX1" fmla="*/ 288032 w 288032"/>
+              <a:gd name="connsiteY1" fmla="*/ 0 h 307740"/>
+              <a:gd name="connsiteX2" fmla="*/ 288032 w 288032"/>
+              <a:gd name="connsiteY2" fmla="*/ 307740 h 307740"/>
+              <a:gd name="connsiteX3" fmla="*/ 0 w 288032"/>
+              <a:gd name="connsiteY3" fmla="*/ 307740 h 307740"/>
+              <a:gd name="connsiteX4" fmla="*/ 0 w 288032"/>
+              <a:gd name="connsiteY4" fmla="*/ 0 h 307740"/>
+              <a:gd name="connsiteX0" fmla="*/ 288032 w 379472"/>
+              <a:gd name="connsiteY0" fmla="*/ 0 h 307740"/>
+              <a:gd name="connsiteX1" fmla="*/ 288032 w 379472"/>
+              <a:gd name="connsiteY1" fmla="*/ 307740 h 307740"/>
+              <a:gd name="connsiteX2" fmla="*/ 0 w 379472"/>
+              <a:gd name="connsiteY2" fmla="*/ 307740 h 307740"/>
+              <a:gd name="connsiteX3" fmla="*/ 0 w 379472"/>
+              <a:gd name="connsiteY3" fmla="*/ 0 h 307740"/>
+              <a:gd name="connsiteX4" fmla="*/ 379472 w 379472"/>
+              <a:gd name="connsiteY4" fmla="*/ 91440 h 307740"/>
+              <a:gd name="connsiteX0" fmla="*/ 288032 w 288032"/>
+              <a:gd name="connsiteY0" fmla="*/ 0 h 307740"/>
+              <a:gd name="connsiteX1" fmla="*/ 288032 w 288032"/>
+              <a:gd name="connsiteY1" fmla="*/ 307740 h 307740"/>
+              <a:gd name="connsiteX2" fmla="*/ 0 w 288032"/>
+              <a:gd name="connsiteY2" fmla="*/ 307740 h 307740"/>
+              <a:gd name="connsiteX3" fmla="*/ 0 w 288032"/>
+              <a:gd name="connsiteY3" fmla="*/ 0 h 307740"/>
+              <a:gd name="connsiteX0" fmla="*/ 288032 w 288032"/>
+              <a:gd name="connsiteY0" fmla="*/ 307740 h 307740"/>
+              <a:gd name="connsiteX1" fmla="*/ 0 w 288032"/>
+              <a:gd name="connsiteY1" fmla="*/ 307740 h 307740"/>
+              <a:gd name="connsiteX2" fmla="*/ 0 w 288032"/>
+              <a:gd name="connsiteY2" fmla="*/ 0 h 307740"/>
+            </a:gdLst>
+            <a:ahLst/>
+            <a:cxnLst>
+              <a:cxn ang="0">
+                <a:pos x="connsiteX0" y="connsiteY0"/>
+              </a:cxn>
+              <a:cxn ang="0">
+                <a:pos x="connsiteX1" y="connsiteY1"/>
+              </a:cxn>
+              <a:cxn ang="0">
+                <a:pos x="connsiteX2" y="connsiteY2"/>
+              </a:cxn>
+            </a:cxnLst>
+            <a:rect l="l" t="t" r="r" b="b"/>
+            <a:pathLst>
+              <a:path w="288032" h="307740">
+                <a:moveTo>
+                  <a:pt x="288032" y="307740"/>
+                </a:moveTo>
+                <a:lnTo>
+                  <a:pt x="0" y="307740"/>
+                </a:lnTo>
+                <a:lnTo>
+                  <a:pt x="0" y="0"/>
+                </a:lnTo>
+              </a:path>
+            </a:pathLst>
+          </a:custGeom>
+          <a:noFill/>
+          <a:ln w="9525">
+            <a:solidFill>
+              <a:schemeClr val="bg1">
+                <a:lumMod val="50000"/>
+              </a:schemeClr>
+            </a:solidFill>
+            <a:prstDash val="sysDash"/>
+            <a:headEnd type="triangle" w="sm" len="sm"/>
+          </a:ln>
+        </p:spPr>
+        <p:style>
+          <a:lnRef idx="2">
+            <a:schemeClr val="accent1">
+              <a:shade val="50000"/>
+            </a:schemeClr>
+          </a:lnRef>
+          <a:fillRef idx="1">
+            <a:schemeClr val="accent1"/>
+          </a:fillRef>
+          <a:effectRef idx="0">
+            <a:schemeClr val="accent1"/>
+          </a:effectRef>
+          <a:fontRef idx="minor">
+            <a:schemeClr val="lt1"/>
+          </a:fontRef>
+        </p:style>
+        <p:txBody>
+          <a:bodyPr rtlCol="0" anchor="ctr"/>
+          <a:lstStyle/>
+          <a:p>
+            <a:pPr algn="ctr"/>
+            <a:endParaRPr lang="en-US"/>
+          </a:p>
+        </p:txBody>
+      </p:sp>
+      <p:sp>
+        <p:nvSpPr>
+          <p:cNvPr id="198" name="TextBox 197"/>
+          <p:cNvSpPr txBox="1"/>
+          <p:nvPr/>
+        </p:nvSpPr>
+        <p:spPr>
+          <a:xfrm>
+            <a:off x="179512" y="764704"/>
+            <a:ext cx="1059008" cy="276999"/>
+          </a:xfrm>
+          <a:prstGeom prst="rect">
+            <a:avLst/>
+          </a:prstGeom>
+          <a:noFill/>
+        </p:spPr>
+        <p:txBody>
+          <a:bodyPr wrap="none" rtlCol="0">
+            <a:spAutoFit/>
+          </a:bodyPr>
+          <a:lstStyle/>
+          <a:p>
+            <a:pPr algn="ctr"/>
+            <a:r>
+              <a:rPr lang="en-US" sz="1200" dirty="0" smtClean="0">
+                <a:latin typeface="Arial" panose="020B0604020202020204" pitchFamily="34" charset="0"/>
+                <a:cs typeface="Arial" panose="020B0604020202020204" pitchFamily="34" charset="0"/>
+              </a:rPr>
+              <a:t>Wallet / User</a:t>
+            </a:r>
+            <a:endParaRPr lang="en-US" sz="1200" dirty="0">
+              <a:latin typeface="Arial" panose="020B0604020202020204" pitchFamily="34" charset="0"/>
+              <a:cs typeface="Arial" panose="020B0604020202020204" pitchFamily="34" charset="0"/>
+            </a:endParaRPr>
+          </a:p>
+        </p:txBody>
+      </p:sp>
     </p:spTree>
     <p:extLst>
       <p:ext uri="{BB962C8B-B14F-4D97-AF65-F5344CB8AC3E}">

</xml_diff>

<commit_message>
Added a numbered step
</commit_message>
<xml_diff>
--- a/saturn/epi(presumed)-vs-saturn.pptx
+++ b/saturn/epi(presumed)-vs-saturn.pptx
@@ -10473,28 +10473,7 @@
                 <a:latin typeface="Arial" panose="020B0604020202020204" pitchFamily="34" charset="0"/>
                 <a:cs typeface="Arial" panose="020B0604020202020204" pitchFamily="34" charset="0"/>
               </a:rPr>
-              <a:t>model also </a:t>
-            </a:r>
-            <a:r>
-              <a:rPr lang="en-US" sz="1000" dirty="0" smtClean="0">
-                <a:latin typeface="Arial" panose="020B0604020202020204" pitchFamily="34" charset="0"/>
-                <a:cs typeface="Arial" panose="020B0604020202020204" pitchFamily="34" charset="0"/>
-              </a:rPr>
-              <a:t>relies</a:t>
-            </a:r>
-            <a:r>
-              <a:rPr lang="en-US" sz="1000" dirty="0" smtClean="0">
-                <a:latin typeface="Arial" panose="020B0604020202020204" pitchFamily="34" charset="0"/>
-                <a:cs typeface="Arial" panose="020B0604020202020204" pitchFamily="34" charset="0"/>
-              </a:rPr>
-              <a:t> </a:t>
-            </a:r>
-            <a:r>
-              <a:rPr lang="en-US" sz="1000" dirty="0" smtClean="0">
-                <a:latin typeface="Arial" panose="020B0604020202020204" pitchFamily="34" charset="0"/>
-                <a:cs typeface="Arial" panose="020B0604020202020204" pitchFamily="34" charset="0"/>
-              </a:rPr>
-              <a:t>on </a:t>
+              <a:t>model also relies on </a:t>
             </a:r>
             <a:r>
               <a:rPr lang="en-US" sz="1000" i="1" dirty="0" smtClean="0">
@@ -10624,21 +10603,7 @@
                 <a:latin typeface="Arial" panose="020B0604020202020204" pitchFamily="34" charset="0"/>
                 <a:cs typeface="Arial" panose="020B0604020202020204" pitchFamily="34" charset="0"/>
               </a:rPr>
-              <a:t> (TS), that vouches for the Merchant’s validity </a:t>
-            </a:r>
-            <a:r>
-              <a:rPr lang="en-US" sz="1000" smtClean="0">
-                <a:latin typeface="Arial" panose="020B0604020202020204" pitchFamily="34" charset="0"/>
-                <a:cs typeface="Arial" panose="020B0604020202020204" pitchFamily="34" charset="0"/>
-              </a:rPr>
-              <a:t>including its claimed </a:t>
-            </a:r>
-            <a:r>
-              <a:rPr lang="en-US" sz="1000" dirty="0" smtClean="0">
-                <a:latin typeface="Arial" panose="020B0604020202020204" pitchFamily="34" charset="0"/>
-                <a:cs typeface="Arial" panose="020B0604020202020204" pitchFamily="34" charset="0"/>
-              </a:rPr>
-              <a:t>account number. </a:t>
+              <a:t> (TS), that vouches for the Merchant’s validity including its claimed account number. </a:t>
             </a:r>
           </a:p>
           <a:p>
@@ -10687,14 +10652,28 @@
                 <a:latin typeface="Arial" panose="020B0604020202020204" pitchFamily="34" charset="0"/>
                 <a:cs typeface="Arial" panose="020B0604020202020204" pitchFamily="34" charset="0"/>
               </a:rPr>
-              <a:t>payment requests </a:t>
+              <a:t>payment requests [</a:t>
             </a:r>
             <a:r>
               <a:rPr lang="en-US" sz="1000" dirty="0">
                 <a:latin typeface="Arial" panose="020B0604020202020204" pitchFamily="34" charset="0"/>
                 <a:cs typeface="Arial" panose="020B0604020202020204" pitchFamily="34" charset="0"/>
               </a:rPr>
-              <a:t>(1) is maintained </a:t>
+              <a:t>2</a:t>
+            </a:r>
+            <a:r>
+              <a:rPr lang="en-US" sz="1000" dirty="0" smtClean="0">
+                <a:latin typeface="Arial" panose="020B0604020202020204" pitchFamily="34" charset="0"/>
+                <a:cs typeface="Arial" panose="020B0604020202020204" pitchFamily="34" charset="0"/>
+              </a:rPr>
+              <a:t>] is </a:t>
+            </a:r>
+            <a:r>
+              <a:rPr lang="en-US" sz="1000" dirty="0">
+                <a:latin typeface="Arial" panose="020B0604020202020204" pitchFamily="34" charset="0"/>
+                <a:cs typeface="Arial" panose="020B0604020202020204" pitchFamily="34" charset="0"/>
+              </a:rPr>
+              <a:t>maintained </a:t>
             </a:r>
             <a:r>
               <a:rPr lang="en-US" sz="1000" dirty="0" smtClean="0">
@@ -10743,7 +10722,7 @@
                 <a:latin typeface="Arial" panose="020B0604020202020204" pitchFamily="34" charset="0"/>
                 <a:cs typeface="Arial" panose="020B0604020202020204" pitchFamily="34" charset="0"/>
               </a:rPr>
-              <a:t>step, combined </a:t>
+              <a:t>step [1], combined </a:t>
             </a:r>
             <a:r>
               <a:rPr lang="en-US" sz="1000" dirty="0">
@@ -10757,21 +10736,21 @@
                 <a:latin typeface="Arial" panose="020B0604020202020204" pitchFamily="34" charset="0"/>
                 <a:cs typeface="Arial" panose="020B0604020202020204" pitchFamily="34" charset="0"/>
               </a:rPr>
-              <a:t>Merchant lookups </a:t>
+              <a:t>Merchant lookups [</a:t>
             </a:r>
             <a:r>
               <a:rPr lang="en-US" sz="1000" dirty="0">
                 <a:latin typeface="Arial" panose="020B0604020202020204" pitchFamily="34" charset="0"/>
                 <a:cs typeface="Arial" panose="020B0604020202020204" pitchFamily="34" charset="0"/>
               </a:rPr>
-              <a:t>(2</a:t>
+              <a:t>3</a:t>
             </a:r>
             <a:r>
               <a:rPr lang="en-US" sz="1000" dirty="0" smtClean="0">
                 <a:latin typeface="Arial" panose="020B0604020202020204" pitchFamily="34" charset="0"/>
                 <a:cs typeface="Arial" panose="020B0604020202020204" pitchFamily="34" charset="0"/>
               </a:rPr>
-              <a:t>).</a:t>
+              <a:t>].</a:t>
             </a:r>
           </a:p>
           <a:p>
@@ -11603,14 +11582,7 @@
                 <a:latin typeface="Arial" panose="020B0604020202020204" pitchFamily="34" charset="0"/>
                 <a:cs typeface="Arial" panose="020B0604020202020204" pitchFamily="34" charset="0"/>
               </a:rPr>
-              <a:t>EPI (Presumed) versus Saturn</a:t>
-            </a:r>
-            <a:r>
-              <a:rPr lang="en-US" sz="800" smtClean="0">
-                <a:latin typeface="Arial" panose="020B0604020202020204" pitchFamily="34" charset="0"/>
-                <a:cs typeface="Arial" panose="020B0604020202020204" pitchFamily="34" charset="0"/>
-              </a:rPr>
-              <a:t>, A.Rundgren-2020-12-02:2</a:t>
+              <a:t>EPI (Presumed) versus Saturn, A.Rundgren-2020-12-02:3</a:t>
             </a:r>
             <a:endParaRPr lang="en-US" sz="800" dirty="0">
               <a:latin typeface="Arial" panose="020B0604020202020204" pitchFamily="34" charset="0"/>
@@ -13087,8 +13059,126 @@
         </p:nvSpPr>
         <p:spPr>
           <a:xfrm>
-            <a:off x="6228184" y="2258428"/>
-            <a:ext cx="180000" cy="180000"/>
+            <a:off x="6218656" y="2264383"/>
+            <a:ext cx="162000" cy="162000"/>
+          </a:xfrm>
+          <a:prstGeom prst="ellipse">
+            <a:avLst/>
+          </a:prstGeom>
+          <a:solidFill>
+            <a:schemeClr val="bg1"/>
+          </a:solidFill>
+          <a:ln w="9525">
+            <a:solidFill>
+              <a:schemeClr val="bg1">
+                <a:lumMod val="50000"/>
+              </a:schemeClr>
+            </a:solidFill>
+          </a:ln>
+        </p:spPr>
+        <p:style>
+          <a:lnRef idx="2">
+            <a:schemeClr val="accent1">
+              <a:shade val="50000"/>
+            </a:schemeClr>
+          </a:lnRef>
+          <a:fillRef idx="1">
+            <a:schemeClr val="accent1"/>
+          </a:fillRef>
+          <a:effectRef idx="0">
+            <a:schemeClr val="accent1"/>
+          </a:effectRef>
+          <a:fontRef idx="minor">
+            <a:schemeClr val="lt1"/>
+          </a:fontRef>
+        </p:style>
+        <p:txBody>
+          <a:bodyPr wrap="none" lIns="0" tIns="0" rIns="0" bIns="10800" rtlCol="0" anchor="ctr" anchorCtr="1">
+            <a:noAutofit/>
+          </a:bodyPr>
+          <a:lstStyle/>
+          <a:p>
+            <a:pPr algn="ctr"/>
+            <a:r>
+              <a:rPr lang="en-US" sz="1200" dirty="0">
+                <a:solidFill>
+                  <a:schemeClr val="tx1"/>
+                </a:solidFill>
+              </a:rPr>
+              <a:t>2</a:t>
+            </a:r>
+          </a:p>
+        </p:txBody>
+      </p:sp>
+      <p:sp>
+        <p:nvSpPr>
+          <p:cNvPr id="215" name="Oval 214"/>
+          <p:cNvSpPr/>
+          <p:nvPr/>
+        </p:nvSpPr>
+        <p:spPr>
+          <a:xfrm>
+            <a:off x="7628493" y="1429246"/>
+            <a:ext cx="162000" cy="162000"/>
+          </a:xfrm>
+          <a:prstGeom prst="ellipse">
+            <a:avLst/>
+          </a:prstGeom>
+          <a:solidFill>
+            <a:schemeClr val="bg1"/>
+          </a:solidFill>
+          <a:ln w="9525">
+            <a:solidFill>
+              <a:schemeClr val="bg1">
+                <a:lumMod val="50000"/>
+              </a:schemeClr>
+            </a:solidFill>
+          </a:ln>
+        </p:spPr>
+        <p:style>
+          <a:lnRef idx="2">
+            <a:schemeClr val="accent1">
+              <a:shade val="50000"/>
+            </a:schemeClr>
+          </a:lnRef>
+          <a:fillRef idx="1">
+            <a:schemeClr val="accent1"/>
+          </a:fillRef>
+          <a:effectRef idx="0">
+            <a:schemeClr val="accent1"/>
+          </a:effectRef>
+          <a:fontRef idx="minor">
+            <a:schemeClr val="lt1"/>
+          </a:fontRef>
+        </p:style>
+        <p:txBody>
+          <a:bodyPr wrap="none" lIns="0" tIns="0" rIns="0" bIns="10800" rtlCol="0" anchor="ctr" anchorCtr="1">
+            <a:noAutofit/>
+          </a:bodyPr>
+          <a:lstStyle/>
+          <a:p>
+            <a:pPr algn="ctr"/>
+            <a:r>
+              <a:rPr lang="en-US" sz="1200" dirty="0">
+                <a:solidFill>
+                  <a:schemeClr val="tx1"/>
+                </a:solidFill>
+              </a:rPr>
+              <a:t>3</a:t>
+            </a:r>
+          </a:p>
+        </p:txBody>
+      </p:sp>
+      <p:sp>
+        <p:nvSpPr>
+          <p:cNvPr id="216" name="Oval 215"/>
+          <p:cNvSpPr/>
+          <p:nvPr/>
+        </p:nvSpPr>
+        <p:spPr>
+          <a:xfrm>
+            <a:off x="5243773" y="1751124"/>
+            <a:ext cx="162000" cy="162000"/>
           </a:xfrm>
           <a:prstGeom prst="ellipse">
             <a:avLst/>
@@ -13140,65 +13230,6 @@
                 <a:schemeClr val="tx1"/>
               </a:solidFill>
             </a:endParaRPr>
-          </a:p>
-        </p:txBody>
-      </p:sp>
-      <p:sp>
-        <p:nvSpPr>
-          <p:cNvPr id="215" name="Oval 214"/>
-          <p:cNvSpPr/>
-          <p:nvPr/>
-        </p:nvSpPr>
-        <p:spPr>
-          <a:xfrm>
-            <a:off x="7601100" y="1420909"/>
-            <a:ext cx="180000" cy="180000"/>
-          </a:xfrm>
-          <a:prstGeom prst="ellipse">
-            <a:avLst/>
-          </a:prstGeom>
-          <a:solidFill>
-            <a:schemeClr val="bg1"/>
-          </a:solidFill>
-          <a:ln w="9525">
-            <a:solidFill>
-              <a:schemeClr val="bg1">
-                <a:lumMod val="50000"/>
-              </a:schemeClr>
-            </a:solidFill>
-          </a:ln>
-        </p:spPr>
-        <p:style>
-          <a:lnRef idx="2">
-            <a:schemeClr val="accent1">
-              <a:shade val="50000"/>
-            </a:schemeClr>
-          </a:lnRef>
-          <a:fillRef idx="1">
-            <a:schemeClr val="accent1"/>
-          </a:fillRef>
-          <a:effectRef idx="0">
-            <a:schemeClr val="accent1"/>
-          </a:effectRef>
-          <a:fontRef idx="minor">
-            <a:schemeClr val="lt1"/>
-          </a:fontRef>
-        </p:style>
-        <p:txBody>
-          <a:bodyPr wrap="none" lIns="0" tIns="0" rIns="0" bIns="10800" rtlCol="0" anchor="ctr" anchorCtr="1">
-            <a:noAutofit/>
-          </a:bodyPr>
-          <a:lstStyle/>
-          <a:p>
-            <a:pPr algn="ctr"/>
-            <a:r>
-              <a:rPr lang="en-US" sz="1200" dirty="0">
-                <a:solidFill>
-                  <a:schemeClr val="tx1"/>
-                </a:solidFill>
-              </a:rPr>
-              <a:t>2</a:t>
-            </a:r>
           </a:p>
         </p:txBody>
       </p:sp>

</xml_diff>

<commit_message>
really minor graphic adj
</commit_message>
<xml_diff>
--- a/saturn/epi(presumed)-vs-saturn.pptx
+++ b/saturn/epi(presumed)-vs-saturn.pptx
@@ -10155,7 +10155,7 @@
         <p:spPr>
           <a:xfrm>
             <a:off x="539552" y="159073"/>
-            <a:ext cx="4173002" cy="369332"/>
+            <a:ext cx="2398413" cy="246221"/>
           </a:xfrm>
           <a:prstGeom prst="rect">
             <a:avLst/>
@@ -10169,20 +10169,20 @@
           <a:lstStyle/>
           <a:p>
             <a:r>
-              <a:rPr lang="en-US" i="1" dirty="0" smtClean="0">
+              <a:rPr lang="en-US" sz="1000" i="1" dirty="0" smtClean="0">
                 <a:latin typeface="Arial" panose="020B0604020202020204" pitchFamily="34" charset="0"/>
                 <a:cs typeface="Arial" panose="020B0604020202020204" pitchFamily="34" charset="0"/>
               </a:rPr>
               <a:t>Presumed</a:t>
             </a:r>
             <a:r>
-              <a:rPr lang="en-US" dirty="0" smtClean="0">
+              <a:rPr lang="en-US" sz="1000" dirty="0" smtClean="0">
                 <a:latin typeface="Arial" panose="020B0604020202020204" pitchFamily="34" charset="0"/>
                 <a:cs typeface="Arial" panose="020B0604020202020204" pitchFamily="34" charset="0"/>
               </a:rPr>
               <a:t> EPI “Front-end” Architecture</a:t>
             </a:r>
-            <a:endParaRPr lang="en-US" dirty="0">
+            <a:endParaRPr lang="en-US" sz="1000" dirty="0">
               <a:latin typeface="Arial" panose="020B0604020202020204" pitchFamily="34" charset="0"/>
               <a:cs typeface="Arial" panose="020B0604020202020204" pitchFamily="34" charset="0"/>
             </a:endParaRPr>
@@ -13059,8 +13059,8 @@
         </p:nvSpPr>
         <p:spPr>
           <a:xfrm>
-            <a:off x="6218656" y="2264383"/>
-            <a:ext cx="162000" cy="162000"/>
+            <a:off x="6209128" y="2273911"/>
+            <a:ext cx="144000" cy="144000"/>
           </a:xfrm>
           <a:prstGeom prst="ellipse">
             <a:avLst/>
@@ -13093,17 +13093,19 @@
           </a:fontRef>
         </p:style>
         <p:txBody>
-          <a:bodyPr wrap="none" lIns="0" tIns="0" rIns="0" bIns="10800" rtlCol="0" anchor="ctr" anchorCtr="1">
+          <a:bodyPr wrap="none" lIns="0" tIns="0" rIns="0" bIns="3600" rtlCol="0" anchor="ctr" anchorCtr="1">
             <a:noAutofit/>
           </a:bodyPr>
           <a:lstStyle/>
           <a:p>
             <a:pPr algn="ctr"/>
             <a:r>
-              <a:rPr lang="en-US" sz="1200" dirty="0">
+              <a:rPr lang="en-US" sz="1000" dirty="0">
                 <a:solidFill>
                   <a:schemeClr val="tx1"/>
                 </a:solidFill>
+                <a:latin typeface="Arial" panose="020B0604020202020204" pitchFamily="34" charset="0"/>
+                <a:cs typeface="Arial" panose="020B0604020202020204" pitchFamily="34" charset="0"/>
               </a:rPr>
               <a:t>2</a:t>
             </a:r>
@@ -13118,8 +13120,8 @@
         </p:nvSpPr>
         <p:spPr>
           <a:xfrm>
-            <a:off x="7628493" y="1429246"/>
-            <a:ext cx="162000" cy="162000"/>
+            <a:off x="7655886" y="1437583"/>
+            <a:ext cx="144000" cy="144000"/>
           </a:xfrm>
           <a:prstGeom prst="ellipse">
             <a:avLst/>
@@ -13152,17 +13154,19 @@
           </a:fontRef>
         </p:style>
         <p:txBody>
-          <a:bodyPr wrap="none" lIns="0" tIns="0" rIns="0" bIns="10800" rtlCol="0" anchor="ctr" anchorCtr="1">
+          <a:bodyPr wrap="none" lIns="0" tIns="0" rIns="0" bIns="3600" rtlCol="0" anchor="ctr" anchorCtr="1">
             <a:noAutofit/>
           </a:bodyPr>
           <a:lstStyle/>
           <a:p>
             <a:pPr algn="ctr"/>
             <a:r>
-              <a:rPr lang="en-US" sz="1200" dirty="0">
+              <a:rPr lang="en-US" sz="1000" dirty="0">
                 <a:solidFill>
                   <a:schemeClr val="tx1"/>
                 </a:solidFill>
+                <a:latin typeface="Arial" panose="020B0604020202020204" pitchFamily="34" charset="0"/>
+                <a:cs typeface="Arial" panose="020B0604020202020204" pitchFamily="34" charset="0"/>
               </a:rPr>
               <a:t>3</a:t>
             </a:r>
@@ -13177,8 +13181,8 @@
         </p:nvSpPr>
         <p:spPr>
           <a:xfrm>
-            <a:off x="5243773" y="1751124"/>
-            <a:ext cx="162000" cy="162000"/>
+            <a:off x="5254492" y="1743978"/>
+            <a:ext cx="144000" cy="144000"/>
           </a:xfrm>
           <a:prstGeom prst="ellipse">
             <a:avLst/>
@@ -13211,24 +13215,28 @@
           </a:fontRef>
         </p:style>
         <p:txBody>
-          <a:bodyPr wrap="none" lIns="0" tIns="0" rIns="0" bIns="10800" rtlCol="0" anchor="ctr" anchorCtr="1">
+          <a:bodyPr wrap="none" lIns="0" tIns="0" rIns="0" bIns="3600" rtlCol="0" anchor="ctr" anchorCtr="1">
             <a:noAutofit/>
           </a:bodyPr>
           <a:lstStyle/>
           <a:p>
             <a:pPr algn="ctr"/>
             <a:r>
-              <a:rPr lang="en-US" sz="1200" dirty="0" smtClean="0">
+              <a:rPr lang="en-US" sz="1000" dirty="0" smtClean="0">
                 <a:solidFill>
                   <a:schemeClr val="tx1"/>
                 </a:solidFill>
+                <a:latin typeface="Arial" panose="020B0604020202020204" pitchFamily="34" charset="0"/>
+                <a:cs typeface="Arial" panose="020B0604020202020204" pitchFamily="34" charset="0"/>
               </a:rPr>
               <a:t>1</a:t>
             </a:r>
-            <a:endParaRPr lang="en-US" sz="1200" dirty="0">
+            <a:endParaRPr lang="en-US" sz="1000" dirty="0">
               <a:solidFill>
                 <a:schemeClr val="tx1"/>
               </a:solidFill>
+              <a:latin typeface="Arial" panose="020B0604020202020204" pitchFamily="34" charset="0"/>
+              <a:cs typeface="Arial" panose="020B0604020202020204" pitchFamily="34" charset="0"/>
             </a:endParaRPr>
           </a:p>
         </p:txBody>

</xml_diff>

<commit_message>
Added explanation to "front-end"
</commit_message>
<xml_diff>
--- a/saturn/epi(presumed)-vs-saturn.pptx
+++ b/saturn/epi(presumed)-vs-saturn.pptx
@@ -288,7 +288,7 @@
           <a:p>
             <a:fld id="{FC080E38-6FF2-48B3-BDAB-4FA23B840E92}" type="datetimeFigureOut">
               <a:rPr lang="en-US" smtClean="0"/>
-              <a:t>2020-12-11</a:t>
+              <a:t>2020-12-17</a:t>
             </a:fld>
             <a:endParaRPr lang="en-US"/>
           </a:p>
@@ -458,7 +458,7 @@
           <a:p>
             <a:fld id="{FC080E38-6FF2-48B3-BDAB-4FA23B840E92}" type="datetimeFigureOut">
               <a:rPr lang="en-US" smtClean="0"/>
-              <a:t>2020-12-11</a:t>
+              <a:t>2020-12-17</a:t>
             </a:fld>
             <a:endParaRPr lang="en-US"/>
           </a:p>
@@ -638,7 +638,7 @@
           <a:p>
             <a:fld id="{FC080E38-6FF2-48B3-BDAB-4FA23B840E92}" type="datetimeFigureOut">
               <a:rPr lang="en-US" smtClean="0"/>
-              <a:t>2020-12-11</a:t>
+              <a:t>2020-12-17</a:t>
             </a:fld>
             <a:endParaRPr lang="en-US"/>
           </a:p>
@@ -808,7 +808,7 @@
           <a:p>
             <a:fld id="{FC080E38-6FF2-48B3-BDAB-4FA23B840E92}" type="datetimeFigureOut">
               <a:rPr lang="en-US" smtClean="0"/>
-              <a:t>2020-12-11</a:t>
+              <a:t>2020-12-17</a:t>
             </a:fld>
             <a:endParaRPr lang="en-US"/>
           </a:p>
@@ -1054,7 +1054,7 @@
           <a:p>
             <a:fld id="{FC080E38-6FF2-48B3-BDAB-4FA23B840E92}" type="datetimeFigureOut">
               <a:rPr lang="en-US" smtClean="0"/>
-              <a:t>2020-12-11</a:t>
+              <a:t>2020-12-17</a:t>
             </a:fld>
             <a:endParaRPr lang="en-US"/>
           </a:p>
@@ -1342,7 +1342,7 @@
           <a:p>
             <a:fld id="{FC080E38-6FF2-48B3-BDAB-4FA23B840E92}" type="datetimeFigureOut">
               <a:rPr lang="en-US" smtClean="0"/>
-              <a:t>2020-12-11</a:t>
+              <a:t>2020-12-17</a:t>
             </a:fld>
             <a:endParaRPr lang="en-US"/>
           </a:p>
@@ -1764,7 +1764,7 @@
           <a:p>
             <a:fld id="{FC080E38-6FF2-48B3-BDAB-4FA23B840E92}" type="datetimeFigureOut">
               <a:rPr lang="en-US" smtClean="0"/>
-              <a:t>2020-12-11</a:t>
+              <a:t>2020-12-17</a:t>
             </a:fld>
             <a:endParaRPr lang="en-US"/>
           </a:p>
@@ -1882,7 +1882,7 @@
           <a:p>
             <a:fld id="{FC080E38-6FF2-48B3-BDAB-4FA23B840E92}" type="datetimeFigureOut">
               <a:rPr lang="en-US" smtClean="0"/>
-              <a:t>2020-12-11</a:t>
+              <a:t>2020-12-17</a:t>
             </a:fld>
             <a:endParaRPr lang="en-US"/>
           </a:p>
@@ -1977,7 +1977,7 @@
           <a:p>
             <a:fld id="{FC080E38-6FF2-48B3-BDAB-4FA23B840E92}" type="datetimeFigureOut">
               <a:rPr lang="en-US" smtClean="0"/>
-              <a:t>2020-12-11</a:t>
+              <a:t>2020-12-17</a:t>
             </a:fld>
             <a:endParaRPr lang="en-US"/>
           </a:p>
@@ -2254,7 +2254,7 @@
           <a:p>
             <a:fld id="{FC080E38-6FF2-48B3-BDAB-4FA23B840E92}" type="datetimeFigureOut">
               <a:rPr lang="en-US" smtClean="0"/>
-              <a:t>2020-12-11</a:t>
+              <a:t>2020-12-17</a:t>
             </a:fld>
             <a:endParaRPr lang="en-US"/>
           </a:p>
@@ -2507,7 +2507,7 @@
           <a:p>
             <a:fld id="{FC080E38-6FF2-48B3-BDAB-4FA23B840E92}" type="datetimeFigureOut">
               <a:rPr lang="en-US" smtClean="0"/>
-              <a:t>2020-12-11</a:t>
+              <a:t>2020-12-17</a:t>
             </a:fld>
             <a:endParaRPr lang="en-US"/>
           </a:p>
@@ -2720,7 +2720,7 @@
           <a:p>
             <a:fld id="{FC080E38-6FF2-48B3-BDAB-4FA23B840E92}" type="datetimeFigureOut">
               <a:rPr lang="en-US" smtClean="0"/>
-              <a:t>2020-12-11</a:t>
+              <a:t>2020-12-17</a:t>
             </a:fld>
             <a:endParaRPr lang="en-US"/>
           </a:p>
@@ -3103,7 +3103,7 @@
         </p:nvGrpSpPr>
         <p:grpSpPr>
           <a:xfrm>
-            <a:off x="1907824" y="1533600"/>
+            <a:off x="1907824" y="1461592"/>
             <a:ext cx="1080000" cy="593437"/>
             <a:chOff x="1907824" y="1101740"/>
             <a:chExt cx="1080000" cy="593437"/>
@@ -3294,7 +3294,7 @@
         </p:nvCxnSpPr>
         <p:spPr>
           <a:xfrm flipV="1">
-            <a:off x="6690249" y="1512000"/>
+            <a:off x="6690249" y="1439992"/>
             <a:ext cx="1231200" cy="1573200"/>
           </a:xfrm>
           <a:prstGeom prst="bentConnector3">
@@ -3336,7 +3336,7 @@
         </p:nvCxnSpPr>
         <p:spPr>
           <a:xfrm flipV="1">
-            <a:off x="6095999" y="1360884"/>
+            <a:off x="6095999" y="1288876"/>
             <a:ext cx="1836000" cy="990000"/>
           </a:xfrm>
           <a:prstGeom prst="bentConnector3">
@@ -3377,7 +3377,7 @@
         </p:nvSpPr>
         <p:spPr>
           <a:xfrm>
-            <a:off x="1547664" y="1152677"/>
+            <a:off x="1547664" y="1080669"/>
             <a:ext cx="1826674" cy="2338879"/>
           </a:xfrm>
           <a:prstGeom prst="roundRect">
@@ -3423,7 +3423,7 @@
         </p:nvGrpSpPr>
         <p:grpSpPr>
           <a:xfrm>
-            <a:off x="5507340" y="2063239"/>
+            <a:off x="5507340" y="1991231"/>
             <a:ext cx="557162" cy="447881"/>
             <a:chOff x="3321759" y="524071"/>
             <a:chExt cx="557162" cy="447881"/>
@@ -4689,7 +4689,7 @@
         </p:nvGrpSpPr>
         <p:grpSpPr>
           <a:xfrm>
-            <a:off x="7924364" y="2897515"/>
+            <a:off x="7924364" y="2825507"/>
             <a:ext cx="927282" cy="687559"/>
             <a:chOff x="4013200" y="3014663"/>
             <a:chExt cx="1117600" cy="828675"/>
@@ -5319,7 +5319,7 @@
         </p:nvGrpSpPr>
         <p:grpSpPr>
           <a:xfrm>
-            <a:off x="7924364" y="1975702"/>
+            <a:off x="7924364" y="1903694"/>
             <a:ext cx="927282" cy="687559"/>
             <a:chOff x="4013200" y="3014663"/>
             <a:chExt cx="1117600" cy="828675"/>
@@ -5949,7 +5949,7 @@
         </p:nvGrpSpPr>
         <p:grpSpPr>
           <a:xfrm>
-            <a:off x="700172" y="2062002"/>
+            <a:off x="700172" y="1989994"/>
             <a:ext cx="557162" cy="447881"/>
             <a:chOff x="3321759" y="524071"/>
             <a:chExt cx="557162" cy="447881"/>
@@ -7183,7 +7183,7 @@
         </p:nvGrpSpPr>
         <p:grpSpPr>
           <a:xfrm>
-            <a:off x="7924364" y="1053890"/>
+            <a:off x="7924364" y="981882"/>
             <a:ext cx="927282" cy="687559"/>
             <a:chOff x="4013200" y="3014663"/>
             <a:chExt cx="1117600" cy="828675"/>
@@ -7813,7 +7813,7 @@
         </p:nvGrpSpPr>
         <p:grpSpPr>
           <a:xfrm>
-            <a:off x="3716726" y="2897515"/>
+            <a:off x="3716726" y="2825507"/>
             <a:ext cx="927282" cy="687559"/>
             <a:chOff x="4013200" y="3014663"/>
             <a:chExt cx="1117600" cy="828675"/>
@@ -8443,7 +8443,7 @@
         </p:nvGrpSpPr>
         <p:grpSpPr>
           <a:xfrm>
-            <a:off x="3716726" y="1975702"/>
+            <a:off x="3716726" y="1903694"/>
             <a:ext cx="927282" cy="687559"/>
             <a:chOff x="4013200" y="3014663"/>
             <a:chExt cx="1117600" cy="828675"/>
@@ -9073,7 +9073,7 @@
         </p:nvGrpSpPr>
         <p:grpSpPr>
           <a:xfrm>
-            <a:off x="3716726" y="1053890"/>
+            <a:off x="3716726" y="981882"/>
             <a:ext cx="927282" cy="687559"/>
             <a:chOff x="4013200" y="3014663"/>
             <a:chExt cx="1117600" cy="828675"/>
@@ -9703,7 +9703,7 @@
         </p:nvCxnSpPr>
         <p:spPr>
           <a:xfrm>
-            <a:off x="1305810" y="2363965"/>
+            <a:off x="1305810" y="2291957"/>
             <a:ext cx="586250" cy="315975"/>
           </a:xfrm>
           <a:prstGeom prst="straightConnector1">
@@ -9739,7 +9739,7 @@
         </p:nvCxnSpPr>
         <p:spPr>
           <a:xfrm>
-            <a:off x="3020616" y="2919413"/>
+            <a:off x="3020616" y="2847405"/>
             <a:ext cx="682228" cy="421481"/>
           </a:xfrm>
           <a:prstGeom prst="straightConnector1">
@@ -9777,7 +9777,7 @@
         </p:nvCxnSpPr>
         <p:spPr>
           <a:xfrm flipV="1">
-            <a:off x="3025378" y="1345722"/>
+            <a:off x="3025378" y="1273714"/>
             <a:ext cx="695482" cy="391400"/>
           </a:xfrm>
           <a:prstGeom prst="straightConnector1">
@@ -9815,7 +9815,7 @@
         </p:nvCxnSpPr>
         <p:spPr>
           <a:xfrm>
-            <a:off x="3034903" y="1925241"/>
+            <a:off x="3034903" y="1853233"/>
             <a:ext cx="670322" cy="342900"/>
           </a:xfrm>
           <a:prstGeom prst="straightConnector1">
@@ -9853,7 +9853,7 @@
         </p:nvCxnSpPr>
         <p:spPr>
           <a:xfrm>
-            <a:off x="2936530" y="2063931"/>
+            <a:off x="2936530" y="1991923"/>
             <a:ext cx="760361" cy="1126944"/>
           </a:xfrm>
           <a:prstGeom prst="straightConnector1">
@@ -9891,7 +9891,7 @@
         </p:nvCxnSpPr>
         <p:spPr>
           <a:xfrm flipV="1">
-            <a:off x="3036498" y="2376488"/>
+            <a:off x="3036498" y="2304480"/>
             <a:ext cx="666346" cy="349461"/>
           </a:xfrm>
           <a:prstGeom prst="straightConnector1">
@@ -9929,7 +9929,7 @@
         </p:nvCxnSpPr>
         <p:spPr>
           <a:xfrm flipV="1">
-            <a:off x="2939653" y="1477993"/>
+            <a:off x="2939653" y="1405985"/>
             <a:ext cx="763955" cy="1103282"/>
           </a:xfrm>
           <a:prstGeom prst="straightConnector1">
@@ -9991,7 +9991,21 @@
                 <a:latin typeface="Arial" panose="020B0604020202020204" pitchFamily="34" charset="0"/>
                 <a:cs typeface="Arial" panose="020B0604020202020204" pitchFamily="34" charset="0"/>
               </a:rPr>
-              <a:t> EPI “Front-end” Architecture</a:t>
+              <a:t> EPI Front-end</a:t>
+            </a:r>
+            <a:r>
+              <a:rPr lang="en-US" sz="1000" dirty="0" smtClean="0">
+                <a:latin typeface="Arial" panose="020B0604020202020204" pitchFamily="34" charset="0"/>
+                <a:cs typeface="Arial" panose="020B0604020202020204" pitchFamily="34" charset="0"/>
+              </a:rPr>
+              <a:t> </a:t>
+            </a:r>
+            <a:r>
+              <a:rPr lang="en-US" dirty="0" smtClean="0">
+                <a:latin typeface="Arial" panose="020B0604020202020204" pitchFamily="34" charset="0"/>
+                <a:cs typeface="Arial" panose="020B0604020202020204" pitchFamily="34" charset="0"/>
+              </a:rPr>
+              <a:t>* Architecture</a:t>
             </a:r>
             <a:endParaRPr lang="en-US" dirty="0">
               <a:latin typeface="Arial" panose="020B0604020202020204" pitchFamily="34" charset="0"/>
@@ -10008,7 +10022,7 @@
         </p:nvSpPr>
         <p:spPr>
           <a:xfrm>
-            <a:off x="570548" y="1780055"/>
+            <a:off x="570548" y="1708047"/>
             <a:ext cx="824265" cy="276999"/>
           </a:xfrm>
           <a:prstGeom prst="rect">
@@ -10045,7 +10059,7 @@
         </p:nvSpPr>
         <p:spPr>
           <a:xfrm>
-            <a:off x="5368490" y="1780055"/>
+            <a:off x="5368490" y="1708047"/>
             <a:ext cx="824265" cy="276999"/>
           </a:xfrm>
           <a:prstGeom prst="rect">
@@ -10082,7 +10096,7 @@
         </p:nvSpPr>
         <p:spPr>
           <a:xfrm>
-            <a:off x="3540598" y="703729"/>
+            <a:off x="3540598" y="631721"/>
             <a:ext cx="1072730" cy="276999"/>
           </a:xfrm>
           <a:prstGeom prst="rect">
@@ -10119,7 +10133,7 @@
         </p:nvSpPr>
         <p:spPr>
           <a:xfrm>
-            <a:off x="7819750" y="703729"/>
+            <a:off x="7819750" y="631721"/>
             <a:ext cx="1072730" cy="276999"/>
           </a:xfrm>
           <a:prstGeom prst="rect">
@@ -10156,7 +10170,7 @@
         </p:nvSpPr>
         <p:spPr>
           <a:xfrm>
-            <a:off x="1664438" y="703729"/>
+            <a:off x="1664438" y="631721"/>
             <a:ext cx="1592103" cy="276999"/>
           </a:xfrm>
           <a:prstGeom prst="rect">
@@ -10193,7 +10207,7 @@
         </p:nvSpPr>
         <p:spPr>
           <a:xfrm>
-            <a:off x="323528" y="3790800"/>
+            <a:off x="323528" y="3718792"/>
             <a:ext cx="4152320" cy="2558803"/>
           </a:xfrm>
           <a:prstGeom prst="rect">
@@ -10350,7 +10364,7 @@
         </p:nvSpPr>
         <p:spPr>
           <a:xfrm>
-            <a:off x="4803523" y="3789040"/>
+            <a:off x="4803523" y="3717032"/>
             <a:ext cx="4006800" cy="2854648"/>
           </a:xfrm>
           <a:prstGeom prst="rect">
@@ -10616,7 +10630,7 @@
         </p:nvGrpSpPr>
         <p:grpSpPr>
           <a:xfrm>
-            <a:off x="5347532" y="2897992"/>
+            <a:off x="5347532" y="2825984"/>
             <a:ext cx="927282" cy="687559"/>
             <a:chOff x="4013200" y="3014663"/>
             <a:chExt cx="1117600" cy="828675"/>
@@ -11246,7 +11260,7 @@
         </p:nvSpPr>
         <p:spPr>
           <a:xfrm>
-            <a:off x="5167964" y="2647945"/>
+            <a:off x="5167964" y="2575937"/>
             <a:ext cx="1217000" cy="276999"/>
           </a:xfrm>
           <a:prstGeom prst="rect">
@@ -11283,7 +11297,7 @@
         </p:nvSpPr>
         <p:spPr>
           <a:xfrm>
-            <a:off x="6233519" y="2935190"/>
+            <a:off x="6233519" y="2863182"/>
             <a:ext cx="396000" cy="288000"/>
           </a:xfrm>
           <a:prstGeom prst="ellipse">
@@ -11396,7 +11410,7 @@
                 <a:latin typeface="Arial" panose="020B0604020202020204" pitchFamily="34" charset="0"/>
                 <a:cs typeface="Arial" panose="020B0604020202020204" pitchFamily="34" charset="0"/>
               </a:rPr>
-              <a:t>Presumed EPI architecture versus Saturn in a C2B scenario, A.Rundgren-2020-12-11:1</a:t>
+              <a:t>Presumed EPI architecture versus Saturn in a C2B scenario, A.Rundgren-2020-12-17:1</a:t>
             </a:r>
             <a:endParaRPr lang="en-US" sz="800" dirty="0">
               <a:latin typeface="Arial" panose="020B0604020202020204" pitchFamily="34" charset="0"/>
@@ -11413,7 +11427,7 @@
         </p:nvSpPr>
         <p:spPr>
           <a:xfrm>
-            <a:off x="6168086" y="1552028"/>
+            <a:off x="6168086" y="1480020"/>
             <a:ext cx="1096302" cy="182325"/>
           </a:xfrm>
           <a:prstGeom prst="roundRect">
@@ -11466,7 +11480,7 @@
         </p:nvSpPr>
         <p:spPr>
           <a:xfrm>
-            <a:off x="6866728" y="2714875"/>
+            <a:off x="6866728" y="2642867"/>
             <a:ext cx="1067169" cy="182325"/>
           </a:xfrm>
           <a:prstGeom prst="roundRect">
@@ -11519,7 +11533,7 @@
         </p:nvGrpSpPr>
         <p:grpSpPr>
           <a:xfrm>
-            <a:off x="6448326" y="3185182"/>
+            <a:off x="6448326" y="3113174"/>
             <a:ext cx="288000" cy="315826"/>
             <a:chOff x="7439528" y="2941466"/>
             <a:chExt cx="216024" cy="262996"/>
@@ -11644,7 +11658,7 @@
         </p:blipFill>
         <p:spPr bwMode="auto">
           <a:xfrm>
-            <a:off x="5523056" y="1014239"/>
+            <a:off x="5523056" y="942231"/>
             <a:ext cx="540000" cy="540000"/>
           </a:xfrm>
           <a:prstGeom prst="rect">
@@ -11677,7 +11691,7 @@
         </p:nvGrpSpPr>
         <p:grpSpPr>
           <a:xfrm>
-            <a:off x="5142358" y="1088792"/>
+            <a:off x="5142358" y="1016784"/>
             <a:ext cx="359900" cy="468000"/>
             <a:chOff x="5523510" y="2050055"/>
             <a:chExt cx="359900" cy="502719"/>
@@ -11937,7 +11951,7 @@
         </p:nvSpPr>
         <p:spPr>
           <a:xfrm>
-            <a:off x="5327161" y="1624222"/>
+            <a:off x="5327161" y="1552214"/>
             <a:ext cx="183867" cy="724658"/>
           </a:xfrm>
           <a:custGeom>
@@ -12049,7 +12063,7 @@
         </p:nvSpPr>
         <p:spPr>
           <a:xfrm>
-            <a:off x="5004048" y="705592"/>
+            <a:off x="5004048" y="633584"/>
             <a:ext cx="1059008" cy="276999"/>
           </a:xfrm>
           <a:prstGeom prst="rect">
@@ -12101,7 +12115,7 @@
         </p:blipFill>
         <p:spPr bwMode="auto">
           <a:xfrm>
-            <a:off x="698520" y="1001343"/>
+            <a:off x="698520" y="929335"/>
             <a:ext cx="540000" cy="540000"/>
           </a:xfrm>
           <a:prstGeom prst="rect">
@@ -12134,7 +12148,7 @@
         </p:nvGrpSpPr>
         <p:grpSpPr>
           <a:xfrm>
-            <a:off x="317822" y="1075896"/>
+            <a:off x="317822" y="1003888"/>
             <a:ext cx="359900" cy="468000"/>
             <a:chOff x="5523510" y="2050055"/>
             <a:chExt cx="359900" cy="502719"/>
@@ -12394,7 +12408,7 @@
         </p:nvSpPr>
         <p:spPr>
           <a:xfrm>
-            <a:off x="502625" y="1611326"/>
+            <a:off x="502625" y="1539318"/>
             <a:ext cx="183867" cy="724658"/>
           </a:xfrm>
           <a:custGeom>
@@ -12506,7 +12520,7 @@
         </p:nvSpPr>
         <p:spPr>
           <a:xfrm>
-            <a:off x="179512" y="692696"/>
+            <a:off x="179512" y="620688"/>
             <a:ext cx="1059008" cy="276999"/>
           </a:xfrm>
           <a:prstGeom prst="rect">
@@ -12557,7 +12571,7 @@
         </p:blipFill>
         <p:spPr>
           <a:xfrm>
-            <a:off x="338660" y="2780928"/>
+            <a:off x="338660" y="2708920"/>
             <a:ext cx="938404" cy="586970"/>
           </a:xfrm>
           <a:prstGeom prst="rect">
@@ -12573,7 +12587,7 @@
         </p:nvSpPr>
         <p:spPr>
           <a:xfrm flipV="1">
-            <a:off x="499701" y="2416309"/>
+            <a:off x="499701" y="2344301"/>
             <a:ext cx="183867" cy="324000"/>
           </a:xfrm>
           <a:custGeom>
@@ -12685,7 +12699,7 @@
         </p:nvSpPr>
         <p:spPr>
           <a:xfrm>
-            <a:off x="323531" y="3356992"/>
+            <a:off x="323531" y="3284984"/>
             <a:ext cx="950260" cy="276999"/>
           </a:xfrm>
           <a:prstGeom prst="rect">
@@ -12722,7 +12736,7 @@
         </p:nvSpPr>
         <p:spPr>
           <a:xfrm>
-            <a:off x="446688" y="5456084"/>
+            <a:off x="446688" y="5384076"/>
             <a:ext cx="3906000" cy="784830"/>
           </a:xfrm>
           <a:prstGeom prst="rect">
@@ -12826,7 +12840,7 @@
         </p:nvSpPr>
         <p:spPr>
           <a:xfrm>
-            <a:off x="4927125" y="5977097"/>
+            <a:off x="4927125" y="5905089"/>
             <a:ext cx="3758400" cy="553998"/>
           </a:xfrm>
           <a:prstGeom prst="rect">
@@ -12857,7 +12871,21 @@
                 <a:latin typeface="Arial" panose="020B0604020202020204" pitchFamily="34" charset="0"/>
                 <a:cs typeface="Arial" panose="020B0604020202020204" pitchFamily="34" charset="0"/>
               </a:rPr>
-              <a:t>eliminating “front-end” intermediaries</a:t>
+              <a:t>eliminating front-end</a:t>
+            </a:r>
+            <a:r>
+              <a:rPr lang="en-US" sz="500" i="1" dirty="0" smtClean="0">
+                <a:latin typeface="Arial" panose="020B0604020202020204" pitchFamily="34" charset="0"/>
+                <a:cs typeface="Arial" panose="020B0604020202020204" pitchFamily="34" charset="0"/>
+              </a:rPr>
+              <a:t> </a:t>
+            </a:r>
+            <a:r>
+              <a:rPr lang="en-US" sz="1000" i="1" dirty="0" smtClean="0">
+                <a:latin typeface="Arial" panose="020B0604020202020204" pitchFamily="34" charset="0"/>
+                <a:cs typeface="Arial" panose="020B0604020202020204" pitchFamily="34" charset="0"/>
+              </a:rPr>
+              <a:t>* intermediaries</a:t>
             </a:r>
             <a:r>
               <a:rPr lang="en-US" sz="1000" dirty="0" smtClean="0">
@@ -12919,7 +12947,7 @@
         </p:nvSpPr>
         <p:spPr>
           <a:xfrm>
-            <a:off x="6209128" y="2278800"/>
+            <a:off x="6209128" y="2206792"/>
             <a:ext cx="144000" cy="144000"/>
           </a:xfrm>
           <a:prstGeom prst="ellipse">
@@ -12980,7 +13008,7 @@
         </p:nvSpPr>
         <p:spPr>
           <a:xfrm>
-            <a:off x="7665414" y="1437583"/>
+            <a:off x="7665414" y="1365575"/>
             <a:ext cx="144000" cy="144000"/>
           </a:xfrm>
           <a:prstGeom prst="ellipse">
@@ -13041,7 +13069,7 @@
         </p:nvSpPr>
         <p:spPr>
           <a:xfrm>
-            <a:off x="5254492" y="1743978"/>
+            <a:off x="5254492" y="1671970"/>
             <a:ext cx="144000" cy="144000"/>
           </a:xfrm>
           <a:prstGeom prst="ellipse">
@@ -13109,7 +13137,7 @@
         </p:nvGrpSpPr>
         <p:grpSpPr>
           <a:xfrm>
-            <a:off x="1908000" y="2512800"/>
+            <a:off x="1908000" y="2440792"/>
             <a:ext cx="1080000" cy="593437"/>
             <a:chOff x="1907824" y="1101740"/>
             <a:chExt cx="1080000" cy="593437"/>
@@ -13292,6 +13320,63 @@
           </p:txBody>
         </p:sp>
       </p:grpSp>
+      <p:sp>
+        <p:nvSpPr>
+          <p:cNvPr id="219" name="TextBox 218"/>
+          <p:cNvSpPr txBox="1"/>
+          <p:nvPr/>
+        </p:nvSpPr>
+        <p:spPr>
+          <a:xfrm>
+            <a:off x="219644" y="6381328"/>
+            <a:ext cx="2472152" cy="246221"/>
+          </a:xfrm>
+          <a:prstGeom prst="rect">
+            <a:avLst/>
+          </a:prstGeom>
+          <a:noFill/>
+        </p:spPr>
+        <p:txBody>
+          <a:bodyPr wrap="none" rtlCol="0">
+            <a:spAutoFit/>
+          </a:bodyPr>
+          <a:lstStyle/>
+          <a:p>
+            <a:r>
+              <a:rPr lang="en-US" sz="1000" b="1" dirty="0" smtClean="0">
+                <a:latin typeface="Arial" panose="020B0604020202020204" pitchFamily="34" charset="0"/>
+                <a:cs typeface="Arial" panose="020B0604020202020204" pitchFamily="34" charset="0"/>
+              </a:rPr>
+              <a:t>*</a:t>
+            </a:r>
+            <a:r>
+              <a:rPr lang="en-US" sz="1000" dirty="0" smtClean="0">
+                <a:latin typeface="Arial" panose="020B0604020202020204" pitchFamily="34" charset="0"/>
+                <a:cs typeface="Arial" panose="020B0604020202020204" pitchFamily="34" charset="0"/>
+              </a:rPr>
+              <a:t> Payee and payer </a:t>
+            </a:r>
+            <a:r>
+              <a:rPr lang="en-US" sz="1000" i="1" dirty="0" smtClean="0">
+                <a:latin typeface="Arial" panose="020B0604020202020204" pitchFamily="34" charset="0"/>
+                <a:cs typeface="Arial" panose="020B0604020202020204" pitchFamily="34" charset="0"/>
+              </a:rPr>
+              <a:t>authorization</a:t>
+            </a:r>
+            <a:r>
+              <a:rPr lang="en-US" sz="1000" dirty="0" smtClean="0">
+                <a:latin typeface="Arial" panose="020B0604020202020204" pitchFamily="34" charset="0"/>
+                <a:cs typeface="Arial" panose="020B0604020202020204" pitchFamily="34" charset="0"/>
+              </a:rPr>
+              <a:t> system</a:t>
+            </a:r>
+            <a:endParaRPr lang="en-US" sz="1000" dirty="0">
+              <a:latin typeface="Arial" panose="020B0604020202020204" pitchFamily="34" charset="0"/>
+              <a:cs typeface="Arial" panose="020B0604020202020204" pitchFamily="34" charset="0"/>
+            </a:endParaRPr>
+          </a:p>
+        </p:txBody>
+      </p:sp>
     </p:spTree>
     <p:extLst>
       <p:ext uri="{BB962C8B-B14F-4D97-AF65-F5344CB8AC3E}">

</xml_diff>